<commit_message>
update of the powerpoint
</commit_message>
<xml_diff>
--- a/docs/Lego case assignment.pptx
+++ b/docs/Lego case assignment.pptx
@@ -7,8 +7,10 @@
   <p:sldIdLst>
     <p:sldId id="256" r:id="rId2"/>
     <p:sldId id="257" r:id="rId3"/>
-    <p:sldId id="259" r:id="rId4"/>
-    <p:sldId id="258" r:id="rId5"/>
+    <p:sldId id="260" r:id="rId4"/>
+    <p:sldId id="259" r:id="rId5"/>
+    <p:sldId id="258" r:id="rId6"/>
+    <p:sldId id="261" r:id="rId7"/>
   </p:sldIdLst>
   <p:sldSz cx="12192000" cy="6858000"/>
   <p:notesSz cx="6858000" cy="9144000"/>
@@ -107,7 +109,20 @@
       </a:defRPr>
     </a:lvl9pPr>
   </p:defaultTextStyle>
+  <p:extLst>
+    <p:ext uri="{EFAFB233-063F-42B5-8137-9DF3F51BA10A}">
+      <p15:sldGuideLst xmlns:p15="http://schemas.microsoft.com/office/powerpoint/2012/main"/>
+    </p:ext>
+  </p:extLst>
 </p:presentation>
+</file>
+
+<file path=ppt/revisionInfo.xml><?xml version="1.0" encoding="utf-8"?>
+<p1510:revInfo xmlns:a="http://schemas.openxmlformats.org/drawingml/2006/main" xmlns:r="http://schemas.openxmlformats.org/officeDocument/2006/relationships" xmlns:p1510="http://schemas.microsoft.com/office/powerpoint/2015/10/main">
+  <p1510:revLst>
+    <p1510:client id="{688ED63B-E422-48F7-BD36-4B74E9D5CCA5}" v="1" dt="2024-06-26T19:01:56.580"/>
+  </p1510:revLst>
+</p1510:revInfo>
 </file>
 
 <file path=ppt/slideLayouts/slideLayout1.xml><?xml version="1.0" encoding="utf-8"?>
@@ -259,7 +274,7 @@
           <a:p>
             <a:fld id="{D93B1666-3540-4606-81F9-71B94CD91C6D}" type="datetimeFigureOut">
               <a:rPr lang="LID4096" smtClean="0"/>
-              <a:t>06/25/2024</a:t>
+              <a:t>06/26/2024</a:t>
             </a:fld>
             <a:endParaRPr lang="LID4096"/>
           </a:p>
@@ -459,7 +474,7 @@
           <a:p>
             <a:fld id="{D93B1666-3540-4606-81F9-71B94CD91C6D}" type="datetimeFigureOut">
               <a:rPr lang="LID4096" smtClean="0"/>
-              <a:t>06/25/2024</a:t>
+              <a:t>06/26/2024</a:t>
             </a:fld>
             <a:endParaRPr lang="LID4096"/>
           </a:p>
@@ -669,7 +684,7 @@
           <a:p>
             <a:fld id="{D93B1666-3540-4606-81F9-71B94CD91C6D}" type="datetimeFigureOut">
               <a:rPr lang="LID4096" smtClean="0"/>
-              <a:t>06/25/2024</a:t>
+              <a:t>06/26/2024</a:t>
             </a:fld>
             <a:endParaRPr lang="LID4096"/>
           </a:p>
@@ -869,7 +884,7 @@
           <a:p>
             <a:fld id="{D93B1666-3540-4606-81F9-71B94CD91C6D}" type="datetimeFigureOut">
               <a:rPr lang="LID4096" smtClean="0"/>
-              <a:t>06/25/2024</a:t>
+              <a:t>06/26/2024</a:t>
             </a:fld>
             <a:endParaRPr lang="LID4096"/>
           </a:p>
@@ -1145,7 +1160,7 @@
           <a:p>
             <a:fld id="{D93B1666-3540-4606-81F9-71B94CD91C6D}" type="datetimeFigureOut">
               <a:rPr lang="LID4096" smtClean="0"/>
-              <a:t>06/25/2024</a:t>
+              <a:t>06/26/2024</a:t>
             </a:fld>
             <a:endParaRPr lang="LID4096"/>
           </a:p>
@@ -1413,7 +1428,7 @@
           <a:p>
             <a:fld id="{D93B1666-3540-4606-81F9-71B94CD91C6D}" type="datetimeFigureOut">
               <a:rPr lang="LID4096" smtClean="0"/>
-              <a:t>06/25/2024</a:t>
+              <a:t>06/26/2024</a:t>
             </a:fld>
             <a:endParaRPr lang="LID4096"/>
           </a:p>
@@ -1828,7 +1843,7 @@
           <a:p>
             <a:fld id="{D93B1666-3540-4606-81F9-71B94CD91C6D}" type="datetimeFigureOut">
               <a:rPr lang="LID4096" smtClean="0"/>
-              <a:t>06/25/2024</a:t>
+              <a:t>06/26/2024</a:t>
             </a:fld>
             <a:endParaRPr lang="LID4096"/>
           </a:p>
@@ -1970,7 +1985,7 @@
           <a:p>
             <a:fld id="{D93B1666-3540-4606-81F9-71B94CD91C6D}" type="datetimeFigureOut">
               <a:rPr lang="LID4096" smtClean="0"/>
-              <a:t>06/25/2024</a:t>
+              <a:t>06/26/2024</a:t>
             </a:fld>
             <a:endParaRPr lang="LID4096"/>
           </a:p>
@@ -2083,7 +2098,7 @@
           <a:p>
             <a:fld id="{D93B1666-3540-4606-81F9-71B94CD91C6D}" type="datetimeFigureOut">
               <a:rPr lang="LID4096" smtClean="0"/>
-              <a:t>06/25/2024</a:t>
+              <a:t>06/26/2024</a:t>
             </a:fld>
             <a:endParaRPr lang="LID4096"/>
           </a:p>
@@ -2396,7 +2411,7 @@
           <a:p>
             <a:fld id="{D93B1666-3540-4606-81F9-71B94CD91C6D}" type="datetimeFigureOut">
               <a:rPr lang="LID4096" smtClean="0"/>
-              <a:t>06/25/2024</a:t>
+              <a:t>06/26/2024</a:t>
             </a:fld>
             <a:endParaRPr lang="LID4096"/>
           </a:p>
@@ -2685,7 +2700,7 @@
           <a:p>
             <a:fld id="{D93B1666-3540-4606-81F9-71B94CD91C6D}" type="datetimeFigureOut">
               <a:rPr lang="LID4096" smtClean="0"/>
-              <a:t>06/25/2024</a:t>
+              <a:t>06/26/2024</a:t>
             </a:fld>
             <a:endParaRPr lang="LID4096"/>
           </a:p>
@@ -2928,7 +2943,7 @@
           <a:p>
             <a:fld id="{D93B1666-3540-4606-81F9-71B94CD91C6D}" type="datetimeFigureOut">
               <a:rPr lang="LID4096" smtClean="0"/>
-              <a:t>06/25/2024</a:t>
+              <a:t>06/26/2024</a:t>
             </a:fld>
             <a:endParaRPr lang="LID4096"/>
           </a:p>
@@ -3374,10 +3389,10 @@
           <a:lstStyle/>
           <a:p>
             <a:r>
-              <a:rPr lang="en-US" dirty="0"/>
+              <a:rPr lang="en-US"/>
               <a:t>Lego case assignment</a:t>
             </a:r>
-            <a:endParaRPr lang="LID4096" dirty="0"/>
+            <a:endParaRPr lang="LID4096"/>
           </a:p>
         </p:txBody>
       </p:sp>
@@ -3408,10 +3423,10 @@
           <a:lstStyle/>
           <a:p>
             <a:r>
-              <a:rPr lang="en-US" dirty="0"/>
+              <a:rPr lang="en-US"/>
               <a:t>System overview</a:t>
             </a:r>
-            <a:endParaRPr lang="LID4096" dirty="0"/>
+            <a:endParaRPr lang="LID4096"/>
           </a:p>
         </p:txBody>
       </p:sp>
@@ -3458,10 +3473,10 @@
           <a:p>
             <a:pPr algn="ctr"/>
             <a:r>
-              <a:rPr lang="en-US" dirty="0"/>
+              <a:rPr lang="en-US"/>
               <a:t>Bulk to conveyor</a:t>
             </a:r>
-            <a:endParaRPr lang="LID4096" dirty="0"/>
+            <a:endParaRPr lang="LID4096"/>
           </a:p>
         </p:txBody>
       </p:sp>
@@ -3554,10 +3569,10 @@
           <a:p>
             <a:pPr algn="ctr"/>
             <a:r>
-              <a:rPr lang="en-US" dirty="0"/>
+              <a:rPr lang="en-US"/>
               <a:t>Single line bricks</a:t>
             </a:r>
-            <a:endParaRPr lang="LID4096" dirty="0"/>
+            <a:endParaRPr lang="LID4096"/>
           </a:p>
         </p:txBody>
       </p:sp>
@@ -3650,10 +3665,10 @@
           <a:p>
             <a:pPr algn="ctr"/>
             <a:r>
-              <a:rPr lang="en-US" dirty="0"/>
+              <a:rPr lang="en-US"/>
               <a:t>Size sorting</a:t>
             </a:r>
-            <a:endParaRPr lang="LID4096" dirty="0"/>
+            <a:endParaRPr lang="LID4096"/>
           </a:p>
         </p:txBody>
       </p:sp>
@@ -3746,10 +3761,10 @@
           <a:p>
             <a:pPr algn="ctr"/>
             <a:r>
-              <a:rPr lang="en-US" dirty="0"/>
+              <a:rPr lang="en-US"/>
               <a:t>Weighting  and image collection</a:t>
             </a:r>
-            <a:endParaRPr lang="LID4096" dirty="0"/>
+            <a:endParaRPr lang="LID4096"/>
           </a:p>
         </p:txBody>
       </p:sp>
@@ -3842,10 +3857,10 @@
           <a:p>
             <a:pPr algn="ctr"/>
             <a:r>
-              <a:rPr lang="en-US" dirty="0"/>
+              <a:rPr lang="en-US"/>
               <a:t>Data Analysis =&gt; Brick id</a:t>
             </a:r>
-            <a:endParaRPr lang="LID4096" dirty="0"/>
+            <a:endParaRPr lang="LID4096"/>
           </a:p>
         </p:txBody>
       </p:sp>
@@ -3938,10 +3953,10 @@
           <a:p>
             <a:pPr algn="ctr"/>
             <a:r>
-              <a:rPr lang="en-US" dirty="0"/>
+              <a:rPr lang="en-US"/>
               <a:t>Sorting to sets</a:t>
             </a:r>
-            <a:endParaRPr lang="LID4096" dirty="0"/>
+            <a:endParaRPr lang="LID4096"/>
           </a:p>
         </p:txBody>
       </p:sp>
@@ -4018,10 +4033,10 @@
           <a:p>
             <a:pPr algn="ctr"/>
             <a:r>
-              <a:rPr lang="en-US" dirty="0"/>
+              <a:rPr lang="en-US"/>
               <a:t>Bulk to conveyor</a:t>
             </a:r>
-            <a:endParaRPr lang="LID4096" dirty="0"/>
+            <a:endParaRPr lang="LID4096"/>
           </a:p>
         </p:txBody>
       </p:sp>
@@ -4068,10 +4083,10 @@
           <a:p>
             <a:pPr algn="ctr"/>
             <a:r>
-              <a:rPr lang="en-US" dirty="0"/>
+              <a:rPr lang="en-US"/>
               <a:t>Single line bricks</a:t>
             </a:r>
-            <a:endParaRPr lang="LID4096" dirty="0"/>
+            <a:endParaRPr lang="LID4096"/>
           </a:p>
         </p:txBody>
       </p:sp>
@@ -4089,8 +4104,8 @@
         </p:nvSpPr>
         <p:spPr>
           <a:xfrm>
-            <a:off x="778503" y="3812491"/>
-            <a:ext cx="9588500" cy="2308324"/>
+            <a:off x="778502" y="3609662"/>
+            <a:ext cx="10726957" cy="3046988"/>
           </a:xfrm>
           <a:prstGeom prst="rect">
             <a:avLst/>
@@ -4103,12 +4118,19 @@
           </a:bodyPr>
           <a:lstStyle/>
           <a:p>
+            <a:r>
+              <a:rPr lang="en-US" sz="2400" b="1"/>
+              <a:t>Seamless integration between different components:</a:t>
+            </a:r>
+            <a:endParaRPr lang="LID4096" sz="2400" b="1"/>
+          </a:p>
+          <a:p>
             <a:pPr marL="285750" indent="-285750">
               <a:buFont typeface="Arial" panose="020B0604020202020204" pitchFamily="34" charset="0"/>
               <a:buChar char="•"/>
             </a:pPr>
             <a:r>
-              <a:rPr lang="en-US" sz="2400" dirty="0"/>
+              <a:rPr lang="en-US" sz="2400"/>
               <a:t>This is done to track the single brick</a:t>
             </a:r>
           </a:p>
@@ -4118,7 +4140,7 @@
               <a:buChar char="•"/>
             </a:pPr>
             <a:r>
-              <a:rPr lang="en-US" sz="2400" dirty="0"/>
+              <a:rPr lang="en-US" sz="2400"/>
               <a:t>The PLC should be the master which triggers the cameras</a:t>
             </a:r>
           </a:p>
@@ -4128,7 +4150,7 @@
               <a:buChar char="•"/>
             </a:pPr>
             <a:r>
-              <a:rPr lang="en-US" sz="2400" dirty="0"/>
+              <a:rPr lang="en-US" sz="2400"/>
               <a:t>The vision system then simply reports to the PLC what the classification is</a:t>
             </a:r>
           </a:p>
@@ -4138,7 +4160,7 @@
               <a:buChar char="•"/>
             </a:pPr>
             <a:r>
-              <a:rPr lang="en-US" sz="2400" dirty="0"/>
+              <a:rPr lang="en-US" sz="2400"/>
               <a:t>The PLC will also be in charge of updating the database and the running sets as described later on.</a:t>
             </a:r>
           </a:p>
@@ -4147,7 +4169,22 @@
               <a:buFont typeface="Arial" panose="020B0604020202020204" pitchFamily="34" charset="0"/>
               <a:buChar char="•"/>
             </a:pPr>
-            <a:endParaRPr lang="LID4096" sz="2400" dirty="0"/>
+            <a:r>
+              <a:rPr lang="en-US" sz="2400"/>
+              <a:t>Some of the communication could be using snap7. Some directly in the </a:t>
+            </a:r>
+            <a:r>
+              <a:rPr lang="en-US" sz="2400" err="1"/>
+              <a:t>db</a:t>
+            </a:r>
+            <a:endParaRPr lang="en-US" sz="2400"/>
+          </a:p>
+          <a:p>
+            <a:pPr marL="285750" indent="-285750">
+              <a:buFont typeface="Arial" panose="020B0604020202020204" pitchFamily="34" charset="0"/>
+              <a:buChar char="•"/>
+            </a:pPr>
+            <a:endParaRPr lang="LID4096" sz="2400"/>
           </a:p>
         </p:txBody>
       </p:sp>
@@ -4194,10 +4231,10 @@
           <a:p>
             <a:pPr algn="ctr"/>
             <a:r>
-              <a:rPr lang="en-US" dirty="0"/>
+              <a:rPr lang="en-US"/>
               <a:t>PLC</a:t>
             </a:r>
-            <a:endParaRPr lang="LID4096" dirty="0"/>
+            <a:endParaRPr lang="LID4096"/>
           </a:p>
         </p:txBody>
       </p:sp>
@@ -4244,10 +4281,10 @@
           <a:p>
             <a:pPr algn="ctr"/>
             <a:r>
-              <a:rPr lang="en-US" dirty="0"/>
+              <a:rPr lang="en-US"/>
               <a:t>Vision system</a:t>
             </a:r>
-            <a:endParaRPr lang="LID4096" dirty="0"/>
+            <a:endParaRPr lang="LID4096"/>
           </a:p>
         </p:txBody>
       </p:sp>
@@ -4294,10 +4331,10 @@
           <a:p>
             <a:pPr algn="ctr"/>
             <a:r>
-              <a:rPr lang="en-US" dirty="0"/>
+              <a:rPr lang="en-US"/>
               <a:t>Pick and place</a:t>
             </a:r>
-            <a:endParaRPr lang="LID4096" dirty="0"/>
+            <a:endParaRPr lang="LID4096"/>
           </a:p>
         </p:txBody>
       </p:sp>
@@ -4344,10 +4381,10 @@
           <a:p>
             <a:pPr algn="ctr"/>
             <a:r>
-              <a:rPr lang="en-US" dirty="0"/>
+              <a:rPr lang="en-US"/>
               <a:t>Database</a:t>
             </a:r>
-            <a:endParaRPr lang="LID4096" dirty="0"/>
+            <a:endParaRPr lang="LID4096"/>
           </a:p>
         </p:txBody>
       </p:sp>
@@ -4516,6 +4553,1220 @@
       </p:grpSpPr>
       <p:sp>
         <p:nvSpPr>
+          <p:cNvPr id="4" name="Rektangel 3">
+            <a:extLst>
+              <a:ext uri="{FF2B5EF4-FFF2-40B4-BE49-F238E27FC236}">
+                <a16:creationId xmlns:a16="http://schemas.microsoft.com/office/drawing/2014/main" id="{0CB3973C-CD54-1E37-345D-5B506F6039C6}"/>
+              </a:ext>
+            </a:extLst>
+          </p:cNvPr>
+          <p:cNvSpPr/>
+          <p:nvPr/>
+        </p:nvSpPr>
+        <p:spPr>
+          <a:xfrm>
+            <a:off x="386373" y="299975"/>
+            <a:ext cx="1464816" cy="923277"/>
+          </a:xfrm>
+          <a:prstGeom prst="rect">
+            <a:avLst/>
+          </a:prstGeom>
+        </p:spPr>
+        <p:style>
+          <a:lnRef idx="2">
+            <a:schemeClr val="accent1">
+              <a:shade val="15000"/>
+            </a:schemeClr>
+          </a:lnRef>
+          <a:fillRef idx="1">
+            <a:schemeClr val="accent1"/>
+          </a:fillRef>
+          <a:effectRef idx="0">
+            <a:schemeClr val="accent1"/>
+          </a:effectRef>
+          <a:fontRef idx="minor">
+            <a:schemeClr val="lt1"/>
+          </a:fontRef>
+        </p:style>
+        <p:txBody>
+          <a:bodyPr rtlCol="0" anchor="ctr"/>
+          <a:lstStyle/>
+          <a:p>
+            <a:pPr algn="ctr"/>
+            <a:r>
+              <a:rPr lang="en-US"/>
+              <a:t>Bulk to conveyor</a:t>
+            </a:r>
+            <a:endParaRPr lang="LID4096"/>
+          </a:p>
+        </p:txBody>
+      </p:sp>
+      <p:sp>
+        <p:nvSpPr>
+          <p:cNvPr id="5" name="Pil: højre 4">
+            <a:extLst>
+              <a:ext uri="{FF2B5EF4-FFF2-40B4-BE49-F238E27FC236}">
+                <a16:creationId xmlns:a16="http://schemas.microsoft.com/office/drawing/2014/main" id="{B0749EC0-F690-868B-A5CC-152B54B7026B}"/>
+              </a:ext>
+            </a:extLst>
+          </p:cNvPr>
+          <p:cNvSpPr/>
+          <p:nvPr/>
+        </p:nvSpPr>
+        <p:spPr>
+          <a:xfrm>
+            <a:off x="1994274" y="624010"/>
+            <a:ext cx="257453" cy="275208"/>
+          </a:xfrm>
+          <a:prstGeom prst="rightArrow">
+            <a:avLst/>
+          </a:prstGeom>
+        </p:spPr>
+        <p:style>
+          <a:lnRef idx="2">
+            <a:schemeClr val="accent1">
+              <a:shade val="15000"/>
+            </a:schemeClr>
+          </a:lnRef>
+          <a:fillRef idx="1">
+            <a:schemeClr val="accent1"/>
+          </a:fillRef>
+          <a:effectRef idx="0">
+            <a:schemeClr val="accent1"/>
+          </a:effectRef>
+          <a:fontRef idx="minor">
+            <a:schemeClr val="lt1"/>
+          </a:fontRef>
+        </p:style>
+        <p:txBody>
+          <a:bodyPr rtlCol="0" anchor="ctr"/>
+          <a:lstStyle/>
+          <a:p>
+            <a:pPr algn="ctr"/>
+            <a:endParaRPr lang="LID4096"/>
+          </a:p>
+        </p:txBody>
+      </p:sp>
+      <p:sp>
+        <p:nvSpPr>
+          <p:cNvPr id="6" name="Rektangel 5">
+            <a:extLst>
+              <a:ext uri="{FF2B5EF4-FFF2-40B4-BE49-F238E27FC236}">
+                <a16:creationId xmlns:a16="http://schemas.microsoft.com/office/drawing/2014/main" id="{A66AE484-26C6-63CA-86F8-2597A1AFA9FB}"/>
+              </a:ext>
+            </a:extLst>
+          </p:cNvPr>
+          <p:cNvSpPr/>
+          <p:nvPr/>
+        </p:nvSpPr>
+        <p:spPr>
+          <a:xfrm>
+            <a:off x="2394812" y="314419"/>
+            <a:ext cx="1464816" cy="923277"/>
+          </a:xfrm>
+          <a:prstGeom prst="rect">
+            <a:avLst/>
+          </a:prstGeom>
+        </p:spPr>
+        <p:style>
+          <a:lnRef idx="2">
+            <a:schemeClr val="accent1">
+              <a:shade val="15000"/>
+            </a:schemeClr>
+          </a:lnRef>
+          <a:fillRef idx="1">
+            <a:schemeClr val="accent1"/>
+          </a:fillRef>
+          <a:effectRef idx="0">
+            <a:schemeClr val="accent1"/>
+          </a:effectRef>
+          <a:fontRef idx="minor">
+            <a:schemeClr val="lt1"/>
+          </a:fontRef>
+        </p:style>
+        <p:txBody>
+          <a:bodyPr rtlCol="0" anchor="ctr"/>
+          <a:lstStyle/>
+          <a:p>
+            <a:pPr algn="ctr"/>
+            <a:r>
+              <a:rPr lang="en-US"/>
+              <a:t>Single line bricks</a:t>
+            </a:r>
+            <a:endParaRPr lang="LID4096"/>
+          </a:p>
+        </p:txBody>
+      </p:sp>
+      <p:sp>
+        <p:nvSpPr>
+          <p:cNvPr id="7" name="Pil: højre 6">
+            <a:extLst>
+              <a:ext uri="{FF2B5EF4-FFF2-40B4-BE49-F238E27FC236}">
+                <a16:creationId xmlns:a16="http://schemas.microsoft.com/office/drawing/2014/main" id="{98039EA3-D915-D0A6-F3B3-8FD64D9E7505}"/>
+              </a:ext>
+            </a:extLst>
+          </p:cNvPr>
+          <p:cNvSpPr/>
+          <p:nvPr/>
+        </p:nvSpPr>
+        <p:spPr>
+          <a:xfrm>
+            <a:off x="4002713" y="624009"/>
+            <a:ext cx="257453" cy="275208"/>
+          </a:xfrm>
+          <a:prstGeom prst="rightArrow">
+            <a:avLst/>
+          </a:prstGeom>
+        </p:spPr>
+        <p:style>
+          <a:lnRef idx="2">
+            <a:schemeClr val="accent1">
+              <a:shade val="15000"/>
+            </a:schemeClr>
+          </a:lnRef>
+          <a:fillRef idx="1">
+            <a:schemeClr val="accent1"/>
+          </a:fillRef>
+          <a:effectRef idx="0">
+            <a:schemeClr val="accent1"/>
+          </a:effectRef>
+          <a:fontRef idx="minor">
+            <a:schemeClr val="lt1"/>
+          </a:fontRef>
+        </p:style>
+        <p:txBody>
+          <a:bodyPr rtlCol="0" anchor="ctr"/>
+          <a:lstStyle/>
+          <a:p>
+            <a:pPr algn="ctr"/>
+            <a:endParaRPr lang="LID4096"/>
+          </a:p>
+        </p:txBody>
+      </p:sp>
+      <p:sp>
+        <p:nvSpPr>
+          <p:cNvPr id="8" name="Rektangel 7">
+            <a:extLst>
+              <a:ext uri="{FF2B5EF4-FFF2-40B4-BE49-F238E27FC236}">
+                <a16:creationId xmlns:a16="http://schemas.microsoft.com/office/drawing/2014/main" id="{1626D520-0B7B-1AB3-6747-0EE02689BF6C}"/>
+              </a:ext>
+            </a:extLst>
+          </p:cNvPr>
+          <p:cNvSpPr/>
+          <p:nvPr/>
+        </p:nvSpPr>
+        <p:spPr>
+          <a:xfrm>
+            <a:off x="4403251" y="314419"/>
+            <a:ext cx="1464816" cy="923277"/>
+          </a:xfrm>
+          <a:prstGeom prst="rect">
+            <a:avLst/>
+          </a:prstGeom>
+        </p:spPr>
+        <p:style>
+          <a:lnRef idx="2">
+            <a:schemeClr val="accent1">
+              <a:shade val="15000"/>
+            </a:schemeClr>
+          </a:lnRef>
+          <a:fillRef idx="1">
+            <a:schemeClr val="accent1"/>
+          </a:fillRef>
+          <a:effectRef idx="0">
+            <a:schemeClr val="accent1"/>
+          </a:effectRef>
+          <a:fontRef idx="minor">
+            <a:schemeClr val="lt1"/>
+          </a:fontRef>
+        </p:style>
+        <p:txBody>
+          <a:bodyPr rtlCol="0" anchor="ctr"/>
+          <a:lstStyle/>
+          <a:p>
+            <a:pPr algn="ctr"/>
+            <a:r>
+              <a:rPr lang="en-US"/>
+              <a:t>Size sorting</a:t>
+            </a:r>
+            <a:endParaRPr lang="LID4096"/>
+          </a:p>
+        </p:txBody>
+      </p:sp>
+      <p:sp>
+        <p:nvSpPr>
+          <p:cNvPr id="9" name="Pil: højre 8">
+            <a:extLst>
+              <a:ext uri="{FF2B5EF4-FFF2-40B4-BE49-F238E27FC236}">
+                <a16:creationId xmlns:a16="http://schemas.microsoft.com/office/drawing/2014/main" id="{D808AC85-8CCC-1FE3-9876-D849858432C8}"/>
+              </a:ext>
+            </a:extLst>
+          </p:cNvPr>
+          <p:cNvSpPr/>
+          <p:nvPr/>
+        </p:nvSpPr>
+        <p:spPr>
+          <a:xfrm>
+            <a:off x="6011152" y="624009"/>
+            <a:ext cx="257453" cy="275208"/>
+          </a:xfrm>
+          <a:prstGeom prst="rightArrow">
+            <a:avLst/>
+          </a:prstGeom>
+        </p:spPr>
+        <p:style>
+          <a:lnRef idx="2">
+            <a:schemeClr val="accent1">
+              <a:shade val="15000"/>
+            </a:schemeClr>
+          </a:lnRef>
+          <a:fillRef idx="1">
+            <a:schemeClr val="accent1"/>
+          </a:fillRef>
+          <a:effectRef idx="0">
+            <a:schemeClr val="accent1"/>
+          </a:effectRef>
+          <a:fontRef idx="minor">
+            <a:schemeClr val="lt1"/>
+          </a:fontRef>
+        </p:style>
+        <p:txBody>
+          <a:bodyPr rtlCol="0" anchor="ctr"/>
+          <a:lstStyle/>
+          <a:p>
+            <a:pPr algn="ctr"/>
+            <a:endParaRPr lang="LID4096"/>
+          </a:p>
+        </p:txBody>
+      </p:sp>
+      <p:sp>
+        <p:nvSpPr>
+          <p:cNvPr id="10" name="Rektangel 9">
+            <a:extLst>
+              <a:ext uri="{FF2B5EF4-FFF2-40B4-BE49-F238E27FC236}">
+                <a16:creationId xmlns:a16="http://schemas.microsoft.com/office/drawing/2014/main" id="{A6072283-AA1C-A0FC-3477-26381CEFFC74}"/>
+              </a:ext>
+            </a:extLst>
+          </p:cNvPr>
+          <p:cNvSpPr/>
+          <p:nvPr/>
+        </p:nvSpPr>
+        <p:spPr>
+          <a:xfrm>
+            <a:off x="6411690" y="299975"/>
+            <a:ext cx="1464816" cy="923277"/>
+          </a:xfrm>
+          <a:prstGeom prst="rect">
+            <a:avLst/>
+          </a:prstGeom>
+        </p:spPr>
+        <p:style>
+          <a:lnRef idx="2">
+            <a:schemeClr val="accent1">
+              <a:shade val="15000"/>
+            </a:schemeClr>
+          </a:lnRef>
+          <a:fillRef idx="1">
+            <a:schemeClr val="accent1"/>
+          </a:fillRef>
+          <a:effectRef idx="0">
+            <a:schemeClr val="accent1"/>
+          </a:effectRef>
+          <a:fontRef idx="minor">
+            <a:schemeClr val="lt1"/>
+          </a:fontRef>
+        </p:style>
+        <p:txBody>
+          <a:bodyPr rtlCol="0" anchor="ctr"/>
+          <a:lstStyle/>
+          <a:p>
+            <a:pPr algn="ctr"/>
+            <a:r>
+              <a:rPr lang="en-US"/>
+              <a:t>Weighting  and image collection</a:t>
+            </a:r>
+            <a:endParaRPr lang="LID4096"/>
+          </a:p>
+        </p:txBody>
+      </p:sp>
+      <p:sp>
+        <p:nvSpPr>
+          <p:cNvPr id="11" name="Pil: højre 10">
+            <a:extLst>
+              <a:ext uri="{FF2B5EF4-FFF2-40B4-BE49-F238E27FC236}">
+                <a16:creationId xmlns:a16="http://schemas.microsoft.com/office/drawing/2014/main" id="{CEED2703-1C92-595E-0E88-914B79A5D3F5}"/>
+              </a:ext>
+            </a:extLst>
+          </p:cNvPr>
+          <p:cNvSpPr/>
+          <p:nvPr/>
+        </p:nvSpPr>
+        <p:spPr>
+          <a:xfrm>
+            <a:off x="8019591" y="624009"/>
+            <a:ext cx="257453" cy="275208"/>
+          </a:xfrm>
+          <a:prstGeom prst="rightArrow">
+            <a:avLst/>
+          </a:prstGeom>
+        </p:spPr>
+        <p:style>
+          <a:lnRef idx="2">
+            <a:schemeClr val="accent1">
+              <a:shade val="15000"/>
+            </a:schemeClr>
+          </a:lnRef>
+          <a:fillRef idx="1">
+            <a:schemeClr val="accent1"/>
+          </a:fillRef>
+          <a:effectRef idx="0">
+            <a:schemeClr val="accent1"/>
+          </a:effectRef>
+          <a:fontRef idx="minor">
+            <a:schemeClr val="lt1"/>
+          </a:fontRef>
+        </p:style>
+        <p:txBody>
+          <a:bodyPr rtlCol="0" anchor="ctr"/>
+          <a:lstStyle/>
+          <a:p>
+            <a:pPr algn="ctr"/>
+            <a:endParaRPr lang="LID4096"/>
+          </a:p>
+        </p:txBody>
+      </p:sp>
+      <p:sp>
+        <p:nvSpPr>
+          <p:cNvPr id="12" name="Rektangel 11">
+            <a:extLst>
+              <a:ext uri="{FF2B5EF4-FFF2-40B4-BE49-F238E27FC236}">
+                <a16:creationId xmlns:a16="http://schemas.microsoft.com/office/drawing/2014/main" id="{8C622490-DFDC-7249-73CA-4CADAAEBBDED}"/>
+              </a:ext>
+            </a:extLst>
+          </p:cNvPr>
+          <p:cNvSpPr/>
+          <p:nvPr/>
+        </p:nvSpPr>
+        <p:spPr>
+          <a:xfrm>
+            <a:off x="8420129" y="299974"/>
+            <a:ext cx="1464816" cy="923277"/>
+          </a:xfrm>
+          <a:prstGeom prst="rect">
+            <a:avLst/>
+          </a:prstGeom>
+        </p:spPr>
+        <p:style>
+          <a:lnRef idx="2">
+            <a:schemeClr val="accent1">
+              <a:shade val="15000"/>
+            </a:schemeClr>
+          </a:lnRef>
+          <a:fillRef idx="1">
+            <a:schemeClr val="accent1"/>
+          </a:fillRef>
+          <a:effectRef idx="0">
+            <a:schemeClr val="accent1"/>
+          </a:effectRef>
+          <a:fontRef idx="minor">
+            <a:schemeClr val="lt1"/>
+          </a:fontRef>
+        </p:style>
+        <p:txBody>
+          <a:bodyPr rtlCol="0" anchor="ctr"/>
+          <a:lstStyle/>
+          <a:p>
+            <a:pPr algn="ctr"/>
+            <a:r>
+              <a:rPr lang="en-US"/>
+              <a:t>Data Analysis =&gt; Brick id</a:t>
+            </a:r>
+            <a:endParaRPr lang="LID4096"/>
+          </a:p>
+        </p:txBody>
+      </p:sp>
+      <p:sp>
+        <p:nvSpPr>
+          <p:cNvPr id="13" name="Pil: højre 12">
+            <a:extLst>
+              <a:ext uri="{FF2B5EF4-FFF2-40B4-BE49-F238E27FC236}">
+                <a16:creationId xmlns:a16="http://schemas.microsoft.com/office/drawing/2014/main" id="{706746BA-4957-CBC9-C9E5-10F906014AB5}"/>
+              </a:ext>
+            </a:extLst>
+          </p:cNvPr>
+          <p:cNvSpPr/>
+          <p:nvPr/>
+        </p:nvSpPr>
+        <p:spPr>
+          <a:xfrm>
+            <a:off x="10028030" y="624009"/>
+            <a:ext cx="257453" cy="275208"/>
+          </a:xfrm>
+          <a:prstGeom prst="rightArrow">
+            <a:avLst/>
+          </a:prstGeom>
+        </p:spPr>
+        <p:style>
+          <a:lnRef idx="2">
+            <a:schemeClr val="accent1">
+              <a:shade val="15000"/>
+            </a:schemeClr>
+          </a:lnRef>
+          <a:fillRef idx="1">
+            <a:schemeClr val="accent1"/>
+          </a:fillRef>
+          <a:effectRef idx="0">
+            <a:schemeClr val="accent1"/>
+          </a:effectRef>
+          <a:fontRef idx="minor">
+            <a:schemeClr val="lt1"/>
+          </a:fontRef>
+        </p:style>
+        <p:txBody>
+          <a:bodyPr rtlCol="0" anchor="ctr"/>
+          <a:lstStyle/>
+          <a:p>
+            <a:pPr algn="ctr"/>
+            <a:endParaRPr lang="LID4096"/>
+          </a:p>
+        </p:txBody>
+      </p:sp>
+      <p:sp>
+        <p:nvSpPr>
+          <p:cNvPr id="14" name="Rektangel 13">
+            <a:extLst>
+              <a:ext uri="{FF2B5EF4-FFF2-40B4-BE49-F238E27FC236}">
+                <a16:creationId xmlns:a16="http://schemas.microsoft.com/office/drawing/2014/main" id="{F7BBB175-BB6C-35D7-FE84-375C7F255941}"/>
+              </a:ext>
+            </a:extLst>
+          </p:cNvPr>
+          <p:cNvSpPr/>
+          <p:nvPr/>
+        </p:nvSpPr>
+        <p:spPr>
+          <a:xfrm>
+            <a:off x="10428569" y="314419"/>
+            <a:ext cx="1464816" cy="923277"/>
+          </a:xfrm>
+          <a:prstGeom prst="rect">
+            <a:avLst/>
+          </a:prstGeom>
+        </p:spPr>
+        <p:style>
+          <a:lnRef idx="2">
+            <a:schemeClr val="accent1">
+              <a:shade val="15000"/>
+            </a:schemeClr>
+          </a:lnRef>
+          <a:fillRef idx="1">
+            <a:schemeClr val="accent1"/>
+          </a:fillRef>
+          <a:effectRef idx="0">
+            <a:schemeClr val="accent1"/>
+          </a:effectRef>
+          <a:fontRef idx="minor">
+            <a:schemeClr val="lt1"/>
+          </a:fontRef>
+        </p:style>
+        <p:txBody>
+          <a:bodyPr rtlCol="0" anchor="ctr"/>
+          <a:lstStyle/>
+          <a:p>
+            <a:pPr algn="ctr"/>
+            <a:r>
+              <a:rPr lang="en-US"/>
+              <a:t>Sorting to sets</a:t>
+            </a:r>
+            <a:endParaRPr lang="LID4096"/>
+          </a:p>
+        </p:txBody>
+      </p:sp>
+      <p:sp>
+        <p:nvSpPr>
+          <p:cNvPr id="16" name="Undertitel 15">
+            <a:extLst>
+              <a:ext uri="{FF2B5EF4-FFF2-40B4-BE49-F238E27FC236}">
+                <a16:creationId xmlns:a16="http://schemas.microsoft.com/office/drawing/2014/main" id="{721178AF-A371-6F48-6324-ADB69E82FB37}"/>
+              </a:ext>
+            </a:extLst>
+          </p:cNvPr>
+          <p:cNvSpPr>
+            <a:spLocks noGrp="1"/>
+          </p:cNvSpPr>
+          <p:nvPr>
+            <p:ph type="subTitle" idx="1"/>
+          </p:nvPr>
+        </p:nvSpPr>
+        <p:spPr>
+          <a:xfrm>
+            <a:off x="386373" y="1553592"/>
+            <a:ext cx="5537023" cy="2006354"/>
+          </a:xfrm>
+        </p:spPr>
+        <p:txBody>
+          <a:bodyPr/>
+          <a:lstStyle/>
+          <a:p>
+            <a:pPr algn="l"/>
+            <a:r>
+              <a:rPr lang="en-US" b="1" i="0">
+                <a:effectLst/>
+                <a:latin typeface="Calibri" panose="020F0502020204030204" pitchFamily="34" charset="0"/>
+                <a:cs typeface="Calibri" panose="020F0502020204030204" pitchFamily="34" charset="0"/>
+              </a:rPr>
+              <a:t>Engineering practices:</a:t>
+            </a:r>
+          </a:p>
+          <a:p>
+            <a:pPr marL="342900" indent="-342900" algn="l">
+              <a:buFont typeface="Arial" panose="020B0604020202020204" pitchFamily="34" charset="0"/>
+              <a:buChar char="•"/>
+            </a:pPr>
+            <a:r>
+              <a:rPr lang="en-US" b="0" i="0">
+                <a:effectLst/>
+                <a:latin typeface="Calibri" panose="020F0502020204030204" pitchFamily="34" charset="0"/>
+                <a:cs typeface="Calibri" panose="020F0502020204030204" pitchFamily="34" charset="0"/>
+              </a:rPr>
+              <a:t>It is a prototype: Fail quickly</a:t>
+            </a:r>
+          </a:p>
+          <a:p>
+            <a:pPr marL="342900" indent="-342900" algn="l">
+              <a:buFont typeface="Arial" panose="020B0604020202020204" pitchFamily="34" charset="0"/>
+              <a:buChar char="•"/>
+            </a:pPr>
+            <a:r>
+              <a:rPr lang="en-US" b="0" i="0">
+                <a:effectLst/>
+                <a:latin typeface="Calibri" panose="020F0502020204030204" pitchFamily="34" charset="0"/>
+                <a:cs typeface="Calibri" panose="020F0502020204030204" pitchFamily="34" charset="0"/>
+              </a:rPr>
+              <a:t>Agile: Tests</a:t>
+            </a:r>
+          </a:p>
+          <a:p>
+            <a:pPr marL="342900" indent="-342900" algn="l">
+              <a:buFont typeface="Arial" panose="020B0604020202020204" pitchFamily="34" charset="0"/>
+              <a:buChar char="•"/>
+            </a:pPr>
+            <a:r>
+              <a:rPr lang="en-US">
+                <a:latin typeface="Calibri" panose="020F0502020204030204" pitchFamily="34" charset="0"/>
+                <a:cs typeface="Calibri" panose="020F0502020204030204" pitchFamily="34" charset="0"/>
+              </a:rPr>
+              <a:t>Modulate: One thing at a time</a:t>
+            </a:r>
+            <a:endParaRPr lang="en-US" b="0" i="0">
+              <a:effectLst/>
+              <a:latin typeface="Calibri" panose="020F0502020204030204" pitchFamily="34" charset="0"/>
+              <a:cs typeface="Calibri" panose="020F0502020204030204" pitchFamily="34" charset="0"/>
+            </a:endParaRPr>
+          </a:p>
+        </p:txBody>
+      </p:sp>
+      <p:sp>
+        <p:nvSpPr>
+          <p:cNvPr id="19" name="Undertitel 15">
+            <a:extLst>
+              <a:ext uri="{FF2B5EF4-FFF2-40B4-BE49-F238E27FC236}">
+                <a16:creationId xmlns:a16="http://schemas.microsoft.com/office/drawing/2014/main" id="{53892823-EDE4-0294-269A-3D58C3AA492F}"/>
+              </a:ext>
+            </a:extLst>
+          </p:cNvPr>
+          <p:cNvSpPr txBox="1">
+            <a:spLocks/>
+          </p:cNvSpPr>
+          <p:nvPr/>
+        </p:nvSpPr>
+        <p:spPr>
+          <a:xfrm>
+            <a:off x="6268605" y="1576895"/>
+            <a:ext cx="5624780" cy="5063601"/>
+          </a:xfrm>
+          <a:prstGeom prst="rect">
+            <a:avLst/>
+          </a:prstGeom>
+        </p:spPr>
+        <p:txBody>
+          <a:bodyPr vert="horz" lIns="91440" tIns="45720" rIns="91440" bIns="45720" rtlCol="0">
+            <a:normAutofit/>
+          </a:bodyPr>
+          <a:lstStyle>
+            <a:lvl1pPr marL="0" indent="0" algn="ctr" defTabSz="914400" rtl="0" eaLnBrk="1" latinLnBrk="0" hangingPunct="1">
+              <a:lnSpc>
+                <a:spcPct val="90000"/>
+              </a:lnSpc>
+              <a:spcBef>
+                <a:spcPts val="1000"/>
+              </a:spcBef>
+              <a:buFont typeface="Arial" panose="020B0604020202020204" pitchFamily="34" charset="0"/>
+              <a:buNone/>
+              <a:defRPr sz="2400" kern="1200">
+                <a:solidFill>
+                  <a:schemeClr val="tx1"/>
+                </a:solidFill>
+                <a:latin typeface="+mn-lt"/>
+                <a:ea typeface="+mn-ea"/>
+                <a:cs typeface="+mn-cs"/>
+              </a:defRPr>
+            </a:lvl1pPr>
+            <a:lvl2pPr marL="457200" indent="0" algn="ctr" defTabSz="914400" rtl="0" eaLnBrk="1" latinLnBrk="0" hangingPunct="1">
+              <a:lnSpc>
+                <a:spcPct val="90000"/>
+              </a:lnSpc>
+              <a:spcBef>
+                <a:spcPts val="500"/>
+              </a:spcBef>
+              <a:buFont typeface="Arial" panose="020B0604020202020204" pitchFamily="34" charset="0"/>
+              <a:buNone/>
+              <a:defRPr sz="2000" kern="1200">
+                <a:solidFill>
+                  <a:schemeClr val="tx1"/>
+                </a:solidFill>
+                <a:latin typeface="+mn-lt"/>
+                <a:ea typeface="+mn-ea"/>
+                <a:cs typeface="+mn-cs"/>
+              </a:defRPr>
+            </a:lvl2pPr>
+            <a:lvl3pPr marL="914400" indent="0" algn="ctr" defTabSz="914400" rtl="0" eaLnBrk="1" latinLnBrk="0" hangingPunct="1">
+              <a:lnSpc>
+                <a:spcPct val="90000"/>
+              </a:lnSpc>
+              <a:spcBef>
+                <a:spcPts val="500"/>
+              </a:spcBef>
+              <a:buFont typeface="Arial" panose="020B0604020202020204" pitchFamily="34" charset="0"/>
+              <a:buNone/>
+              <a:defRPr sz="1800" kern="1200">
+                <a:solidFill>
+                  <a:schemeClr val="tx1"/>
+                </a:solidFill>
+                <a:latin typeface="+mn-lt"/>
+                <a:ea typeface="+mn-ea"/>
+                <a:cs typeface="+mn-cs"/>
+              </a:defRPr>
+            </a:lvl3pPr>
+            <a:lvl4pPr marL="1371600" indent="0" algn="ctr" defTabSz="914400" rtl="0" eaLnBrk="1" latinLnBrk="0" hangingPunct="1">
+              <a:lnSpc>
+                <a:spcPct val="90000"/>
+              </a:lnSpc>
+              <a:spcBef>
+                <a:spcPts val="500"/>
+              </a:spcBef>
+              <a:buFont typeface="Arial" panose="020B0604020202020204" pitchFamily="34" charset="0"/>
+              <a:buNone/>
+              <a:defRPr sz="1600" kern="1200">
+                <a:solidFill>
+                  <a:schemeClr val="tx1"/>
+                </a:solidFill>
+                <a:latin typeface="+mn-lt"/>
+                <a:ea typeface="+mn-ea"/>
+                <a:cs typeface="+mn-cs"/>
+              </a:defRPr>
+            </a:lvl4pPr>
+            <a:lvl5pPr marL="1828800" indent="0" algn="ctr" defTabSz="914400" rtl="0" eaLnBrk="1" latinLnBrk="0" hangingPunct="1">
+              <a:lnSpc>
+                <a:spcPct val="90000"/>
+              </a:lnSpc>
+              <a:spcBef>
+                <a:spcPts val="500"/>
+              </a:spcBef>
+              <a:buFont typeface="Arial" panose="020B0604020202020204" pitchFamily="34" charset="0"/>
+              <a:buNone/>
+              <a:defRPr sz="1600" kern="1200">
+                <a:solidFill>
+                  <a:schemeClr val="tx1"/>
+                </a:solidFill>
+                <a:latin typeface="+mn-lt"/>
+                <a:ea typeface="+mn-ea"/>
+                <a:cs typeface="+mn-cs"/>
+              </a:defRPr>
+            </a:lvl5pPr>
+            <a:lvl6pPr marL="2286000" indent="0" algn="ctr" defTabSz="914400" rtl="0" eaLnBrk="1" latinLnBrk="0" hangingPunct="1">
+              <a:lnSpc>
+                <a:spcPct val="90000"/>
+              </a:lnSpc>
+              <a:spcBef>
+                <a:spcPts val="500"/>
+              </a:spcBef>
+              <a:buFont typeface="Arial" panose="020B0604020202020204" pitchFamily="34" charset="0"/>
+              <a:buNone/>
+              <a:defRPr sz="1600" kern="1200">
+                <a:solidFill>
+                  <a:schemeClr val="tx1"/>
+                </a:solidFill>
+                <a:latin typeface="+mn-lt"/>
+                <a:ea typeface="+mn-ea"/>
+                <a:cs typeface="+mn-cs"/>
+              </a:defRPr>
+            </a:lvl6pPr>
+            <a:lvl7pPr marL="2743200" indent="0" algn="ctr" defTabSz="914400" rtl="0" eaLnBrk="1" latinLnBrk="0" hangingPunct="1">
+              <a:lnSpc>
+                <a:spcPct val="90000"/>
+              </a:lnSpc>
+              <a:spcBef>
+                <a:spcPts val="500"/>
+              </a:spcBef>
+              <a:buFont typeface="Arial" panose="020B0604020202020204" pitchFamily="34" charset="0"/>
+              <a:buNone/>
+              <a:defRPr sz="1600" kern="1200">
+                <a:solidFill>
+                  <a:schemeClr val="tx1"/>
+                </a:solidFill>
+                <a:latin typeface="+mn-lt"/>
+                <a:ea typeface="+mn-ea"/>
+                <a:cs typeface="+mn-cs"/>
+              </a:defRPr>
+            </a:lvl7pPr>
+            <a:lvl8pPr marL="3200400" indent="0" algn="ctr" defTabSz="914400" rtl="0" eaLnBrk="1" latinLnBrk="0" hangingPunct="1">
+              <a:lnSpc>
+                <a:spcPct val="90000"/>
+              </a:lnSpc>
+              <a:spcBef>
+                <a:spcPts val="500"/>
+              </a:spcBef>
+              <a:buFont typeface="Arial" panose="020B0604020202020204" pitchFamily="34" charset="0"/>
+              <a:buNone/>
+              <a:defRPr sz="1600" kern="1200">
+                <a:solidFill>
+                  <a:schemeClr val="tx1"/>
+                </a:solidFill>
+                <a:latin typeface="+mn-lt"/>
+                <a:ea typeface="+mn-ea"/>
+                <a:cs typeface="+mn-cs"/>
+              </a:defRPr>
+            </a:lvl8pPr>
+            <a:lvl9pPr marL="3657600" indent="0" algn="ctr" defTabSz="914400" rtl="0" eaLnBrk="1" latinLnBrk="0" hangingPunct="1">
+              <a:lnSpc>
+                <a:spcPct val="90000"/>
+              </a:lnSpc>
+              <a:spcBef>
+                <a:spcPts val="500"/>
+              </a:spcBef>
+              <a:buFont typeface="Arial" panose="020B0604020202020204" pitchFamily="34" charset="0"/>
+              <a:buNone/>
+              <a:defRPr sz="1600" kern="1200">
+                <a:solidFill>
+                  <a:schemeClr val="tx1"/>
+                </a:solidFill>
+                <a:latin typeface="+mn-lt"/>
+                <a:ea typeface="+mn-ea"/>
+                <a:cs typeface="+mn-cs"/>
+              </a:defRPr>
+            </a:lvl9pPr>
+          </a:lstStyle>
+          <a:p>
+            <a:pPr algn="l"/>
+            <a:r>
+              <a:rPr lang="en-US" b="1">
+                <a:latin typeface="Calibri" panose="020F0502020204030204" pitchFamily="34" charset="0"/>
+                <a:cs typeface="Calibri" panose="020F0502020204030204" pitchFamily="34" charset="0"/>
+              </a:rPr>
+              <a:t>What could go wrong:</a:t>
+            </a:r>
+          </a:p>
+          <a:p>
+            <a:pPr marL="342900" indent="-342900" algn="l">
+              <a:buFont typeface="Arial" panose="020B0604020202020204" pitchFamily="34" charset="0"/>
+              <a:buChar char="•"/>
+            </a:pPr>
+            <a:r>
+              <a:rPr lang="en-US">
+                <a:latin typeface="Calibri" panose="020F0502020204030204" pitchFamily="34" charset="0"/>
+                <a:cs typeface="Calibri" panose="020F0502020204030204" pitchFamily="34" charset="0"/>
+              </a:rPr>
+              <a:t>False classifications</a:t>
+            </a:r>
+          </a:p>
+          <a:p>
+            <a:pPr marL="800100" lvl="1" indent="-342900" algn="l">
+              <a:buFont typeface="Arial" panose="020B0604020202020204" pitchFamily="34" charset="0"/>
+              <a:buChar char="•"/>
+            </a:pPr>
+            <a:r>
+              <a:rPr lang="en-US">
+                <a:latin typeface="Calibri" panose="020F0502020204030204" pitchFamily="34" charset="0"/>
+                <a:cs typeface="Calibri" panose="020F0502020204030204" pitchFamily="34" charset="0"/>
+              </a:rPr>
+              <a:t>Image </a:t>
+            </a:r>
+            <a:r>
+              <a:rPr lang="en-US" err="1">
+                <a:latin typeface="Calibri" panose="020F0502020204030204" pitchFamily="34" charset="0"/>
+                <a:cs typeface="Calibri" panose="020F0502020204030204" pitchFamily="34" charset="0"/>
+              </a:rPr>
+              <a:t>db</a:t>
+            </a:r>
+            <a:endParaRPr lang="en-US">
+              <a:latin typeface="Calibri" panose="020F0502020204030204" pitchFamily="34" charset="0"/>
+              <a:cs typeface="Calibri" panose="020F0502020204030204" pitchFamily="34" charset="0"/>
+            </a:endParaRPr>
+          </a:p>
+          <a:p>
+            <a:pPr marL="800100" lvl="1" indent="-342900" algn="l">
+              <a:buFont typeface="Arial" panose="020B0604020202020204" pitchFamily="34" charset="0"/>
+              <a:buChar char="•"/>
+            </a:pPr>
+            <a:r>
+              <a:rPr lang="en-US">
+                <a:latin typeface="Calibri" panose="020F0502020204030204" pitchFamily="34" charset="0"/>
+                <a:cs typeface="Calibri" panose="020F0502020204030204" pitchFamily="34" charset="0"/>
+              </a:rPr>
+              <a:t>Final validation</a:t>
+            </a:r>
+          </a:p>
+          <a:p>
+            <a:pPr marL="342900" indent="-342900" algn="l">
+              <a:buFont typeface="Arial" panose="020B0604020202020204" pitchFamily="34" charset="0"/>
+              <a:buChar char="•"/>
+            </a:pPr>
+            <a:r>
+              <a:rPr lang="en-US">
+                <a:latin typeface="Calibri" panose="020F0502020204030204" pitchFamily="34" charset="0"/>
+                <a:cs typeface="Calibri" panose="020F0502020204030204" pitchFamily="34" charset="0"/>
+              </a:rPr>
+              <a:t>Mech. issues (bricks stuck):</a:t>
+            </a:r>
+          </a:p>
+          <a:p>
+            <a:pPr marL="800100" lvl="1" indent="-342900" algn="l">
+              <a:buFont typeface="Arial" panose="020B0604020202020204" pitchFamily="34" charset="0"/>
+              <a:buChar char="•"/>
+            </a:pPr>
+            <a:r>
+              <a:rPr lang="en-US">
+                <a:latin typeface="Calibri" panose="020F0502020204030204" pitchFamily="34" charset="0"/>
+                <a:cs typeface="Calibri" panose="020F0502020204030204" pitchFamily="34" charset="0"/>
+              </a:rPr>
+              <a:t>Quick prototypes –quick fails</a:t>
+            </a:r>
+          </a:p>
+          <a:p>
+            <a:pPr marL="342900" indent="-342900" algn="l">
+              <a:buFont typeface="Arial" panose="020B0604020202020204" pitchFamily="34" charset="0"/>
+              <a:buChar char="•"/>
+            </a:pPr>
+            <a:r>
+              <a:rPr lang="en-US">
+                <a:latin typeface="Calibri" panose="020F0502020204030204" pitchFamily="34" charset="0"/>
+                <a:cs typeface="Calibri" panose="020F0502020204030204" pitchFamily="34" charset="0"/>
+              </a:rPr>
+              <a:t>System to big or inflexible:</a:t>
+            </a:r>
+          </a:p>
+          <a:p>
+            <a:pPr marL="800100" lvl="1" indent="-342900" algn="l">
+              <a:buFont typeface="Arial" panose="020B0604020202020204" pitchFamily="34" charset="0"/>
+              <a:buChar char="•"/>
+            </a:pPr>
+            <a:r>
+              <a:rPr lang="en-US">
+                <a:latin typeface="Calibri" panose="020F0502020204030204" pitchFamily="34" charset="0"/>
+                <a:cs typeface="Calibri" panose="020F0502020204030204" pitchFamily="34" charset="0"/>
+              </a:rPr>
+              <a:t>Updates to the stakeholders.</a:t>
+            </a:r>
+          </a:p>
+          <a:p>
+            <a:pPr marL="342900" indent="-342900" algn="l">
+              <a:buFont typeface="Arial" panose="020B0604020202020204" pitchFamily="34" charset="0"/>
+              <a:buChar char="•"/>
+            </a:pPr>
+            <a:r>
+              <a:rPr lang="en-US">
+                <a:latin typeface="Calibri" panose="020F0502020204030204" pitchFamily="34" charset="0"/>
+                <a:cs typeface="Calibri" panose="020F0502020204030204" pitchFamily="34" charset="0"/>
+              </a:rPr>
+              <a:t>Issues from the operators</a:t>
+            </a:r>
+          </a:p>
+          <a:p>
+            <a:pPr marL="800100" lvl="1" indent="-342900" algn="l">
+              <a:buFont typeface="Arial" panose="020B0604020202020204" pitchFamily="34" charset="0"/>
+              <a:buChar char="•"/>
+            </a:pPr>
+            <a:r>
+              <a:rPr lang="en-US">
+                <a:latin typeface="Calibri" panose="020F0502020204030204" pitchFamily="34" charset="0"/>
+                <a:cs typeface="Calibri" panose="020F0502020204030204" pitchFamily="34" charset="0"/>
+              </a:rPr>
+              <a:t>Communication: no lost income</a:t>
+            </a:r>
+          </a:p>
+          <a:p>
+            <a:pPr marL="342900" indent="-342900" algn="l">
+              <a:buFont typeface="Arial" panose="020B0604020202020204" pitchFamily="34" charset="0"/>
+              <a:buChar char="•"/>
+            </a:pPr>
+            <a:endParaRPr lang="en-US">
+              <a:latin typeface="Calibri" panose="020F0502020204030204" pitchFamily="34" charset="0"/>
+              <a:cs typeface="Calibri" panose="020F0502020204030204" pitchFamily="34" charset="0"/>
+            </a:endParaRPr>
+          </a:p>
+        </p:txBody>
+      </p:sp>
+      <p:sp>
+        <p:nvSpPr>
+          <p:cNvPr id="20" name="Undertitel 15">
+            <a:extLst>
+              <a:ext uri="{FF2B5EF4-FFF2-40B4-BE49-F238E27FC236}">
+                <a16:creationId xmlns:a16="http://schemas.microsoft.com/office/drawing/2014/main" id="{9554D2B0-1656-E0AA-733C-8C3D0476AB84}"/>
+              </a:ext>
+            </a:extLst>
+          </p:cNvPr>
+          <p:cNvSpPr txBox="1">
+            <a:spLocks/>
+          </p:cNvSpPr>
+          <p:nvPr/>
+        </p:nvSpPr>
+        <p:spPr>
+          <a:xfrm>
+            <a:off x="323403" y="4218759"/>
+            <a:ext cx="5537023" cy="2006354"/>
+          </a:xfrm>
+          <a:prstGeom prst="rect">
+            <a:avLst/>
+          </a:prstGeom>
+        </p:spPr>
+        <p:txBody>
+          <a:bodyPr vert="horz" lIns="91440" tIns="45720" rIns="91440" bIns="45720" rtlCol="0">
+            <a:normAutofit/>
+          </a:bodyPr>
+          <a:lstStyle>
+            <a:lvl1pPr marL="0" indent="0" algn="ctr" defTabSz="914400" rtl="0" eaLnBrk="1" latinLnBrk="0" hangingPunct="1">
+              <a:lnSpc>
+                <a:spcPct val="90000"/>
+              </a:lnSpc>
+              <a:spcBef>
+                <a:spcPts val="1000"/>
+              </a:spcBef>
+              <a:buFont typeface="Arial" panose="020B0604020202020204" pitchFamily="34" charset="0"/>
+              <a:buNone/>
+              <a:defRPr sz="2400" kern="1200">
+                <a:solidFill>
+                  <a:schemeClr val="tx1"/>
+                </a:solidFill>
+                <a:latin typeface="+mn-lt"/>
+                <a:ea typeface="+mn-ea"/>
+                <a:cs typeface="+mn-cs"/>
+              </a:defRPr>
+            </a:lvl1pPr>
+            <a:lvl2pPr marL="457200" indent="0" algn="ctr" defTabSz="914400" rtl="0" eaLnBrk="1" latinLnBrk="0" hangingPunct="1">
+              <a:lnSpc>
+                <a:spcPct val="90000"/>
+              </a:lnSpc>
+              <a:spcBef>
+                <a:spcPts val="500"/>
+              </a:spcBef>
+              <a:buFont typeface="Arial" panose="020B0604020202020204" pitchFamily="34" charset="0"/>
+              <a:buNone/>
+              <a:defRPr sz="2000" kern="1200">
+                <a:solidFill>
+                  <a:schemeClr val="tx1"/>
+                </a:solidFill>
+                <a:latin typeface="+mn-lt"/>
+                <a:ea typeface="+mn-ea"/>
+                <a:cs typeface="+mn-cs"/>
+              </a:defRPr>
+            </a:lvl2pPr>
+            <a:lvl3pPr marL="914400" indent="0" algn="ctr" defTabSz="914400" rtl="0" eaLnBrk="1" latinLnBrk="0" hangingPunct="1">
+              <a:lnSpc>
+                <a:spcPct val="90000"/>
+              </a:lnSpc>
+              <a:spcBef>
+                <a:spcPts val="500"/>
+              </a:spcBef>
+              <a:buFont typeface="Arial" panose="020B0604020202020204" pitchFamily="34" charset="0"/>
+              <a:buNone/>
+              <a:defRPr sz="1800" kern="1200">
+                <a:solidFill>
+                  <a:schemeClr val="tx1"/>
+                </a:solidFill>
+                <a:latin typeface="+mn-lt"/>
+                <a:ea typeface="+mn-ea"/>
+                <a:cs typeface="+mn-cs"/>
+              </a:defRPr>
+            </a:lvl3pPr>
+            <a:lvl4pPr marL="1371600" indent="0" algn="ctr" defTabSz="914400" rtl="0" eaLnBrk="1" latinLnBrk="0" hangingPunct="1">
+              <a:lnSpc>
+                <a:spcPct val="90000"/>
+              </a:lnSpc>
+              <a:spcBef>
+                <a:spcPts val="500"/>
+              </a:spcBef>
+              <a:buFont typeface="Arial" panose="020B0604020202020204" pitchFamily="34" charset="0"/>
+              <a:buNone/>
+              <a:defRPr sz="1600" kern="1200">
+                <a:solidFill>
+                  <a:schemeClr val="tx1"/>
+                </a:solidFill>
+                <a:latin typeface="+mn-lt"/>
+                <a:ea typeface="+mn-ea"/>
+                <a:cs typeface="+mn-cs"/>
+              </a:defRPr>
+            </a:lvl4pPr>
+            <a:lvl5pPr marL="1828800" indent="0" algn="ctr" defTabSz="914400" rtl="0" eaLnBrk="1" latinLnBrk="0" hangingPunct="1">
+              <a:lnSpc>
+                <a:spcPct val="90000"/>
+              </a:lnSpc>
+              <a:spcBef>
+                <a:spcPts val="500"/>
+              </a:spcBef>
+              <a:buFont typeface="Arial" panose="020B0604020202020204" pitchFamily="34" charset="0"/>
+              <a:buNone/>
+              <a:defRPr sz="1600" kern="1200">
+                <a:solidFill>
+                  <a:schemeClr val="tx1"/>
+                </a:solidFill>
+                <a:latin typeface="+mn-lt"/>
+                <a:ea typeface="+mn-ea"/>
+                <a:cs typeface="+mn-cs"/>
+              </a:defRPr>
+            </a:lvl5pPr>
+            <a:lvl6pPr marL="2286000" indent="0" algn="ctr" defTabSz="914400" rtl="0" eaLnBrk="1" latinLnBrk="0" hangingPunct="1">
+              <a:lnSpc>
+                <a:spcPct val="90000"/>
+              </a:lnSpc>
+              <a:spcBef>
+                <a:spcPts val="500"/>
+              </a:spcBef>
+              <a:buFont typeface="Arial" panose="020B0604020202020204" pitchFamily="34" charset="0"/>
+              <a:buNone/>
+              <a:defRPr sz="1600" kern="1200">
+                <a:solidFill>
+                  <a:schemeClr val="tx1"/>
+                </a:solidFill>
+                <a:latin typeface="+mn-lt"/>
+                <a:ea typeface="+mn-ea"/>
+                <a:cs typeface="+mn-cs"/>
+              </a:defRPr>
+            </a:lvl6pPr>
+            <a:lvl7pPr marL="2743200" indent="0" algn="ctr" defTabSz="914400" rtl="0" eaLnBrk="1" latinLnBrk="0" hangingPunct="1">
+              <a:lnSpc>
+                <a:spcPct val="90000"/>
+              </a:lnSpc>
+              <a:spcBef>
+                <a:spcPts val="500"/>
+              </a:spcBef>
+              <a:buFont typeface="Arial" panose="020B0604020202020204" pitchFamily="34" charset="0"/>
+              <a:buNone/>
+              <a:defRPr sz="1600" kern="1200">
+                <a:solidFill>
+                  <a:schemeClr val="tx1"/>
+                </a:solidFill>
+                <a:latin typeface="+mn-lt"/>
+                <a:ea typeface="+mn-ea"/>
+                <a:cs typeface="+mn-cs"/>
+              </a:defRPr>
+            </a:lvl7pPr>
+            <a:lvl8pPr marL="3200400" indent="0" algn="ctr" defTabSz="914400" rtl="0" eaLnBrk="1" latinLnBrk="0" hangingPunct="1">
+              <a:lnSpc>
+                <a:spcPct val="90000"/>
+              </a:lnSpc>
+              <a:spcBef>
+                <a:spcPts val="500"/>
+              </a:spcBef>
+              <a:buFont typeface="Arial" panose="020B0604020202020204" pitchFamily="34" charset="0"/>
+              <a:buNone/>
+              <a:defRPr sz="1600" kern="1200">
+                <a:solidFill>
+                  <a:schemeClr val="tx1"/>
+                </a:solidFill>
+                <a:latin typeface="+mn-lt"/>
+                <a:ea typeface="+mn-ea"/>
+                <a:cs typeface="+mn-cs"/>
+              </a:defRPr>
+            </a:lvl8pPr>
+            <a:lvl9pPr marL="3657600" indent="0" algn="ctr" defTabSz="914400" rtl="0" eaLnBrk="1" latinLnBrk="0" hangingPunct="1">
+              <a:lnSpc>
+                <a:spcPct val="90000"/>
+              </a:lnSpc>
+              <a:spcBef>
+                <a:spcPts val="500"/>
+              </a:spcBef>
+              <a:buFont typeface="Arial" panose="020B0604020202020204" pitchFamily="34" charset="0"/>
+              <a:buNone/>
+              <a:defRPr sz="1600" kern="1200">
+                <a:solidFill>
+                  <a:schemeClr val="tx1"/>
+                </a:solidFill>
+                <a:latin typeface="+mn-lt"/>
+                <a:ea typeface="+mn-ea"/>
+                <a:cs typeface="+mn-cs"/>
+              </a:defRPr>
+            </a:lvl9pPr>
+          </a:lstStyle>
+          <a:p>
+            <a:pPr algn="l"/>
+            <a:r>
+              <a:rPr lang="en-US" b="1">
+                <a:latin typeface="Calibri" panose="020F0502020204030204" pitchFamily="34" charset="0"/>
+                <a:cs typeface="Calibri" panose="020F0502020204030204" pitchFamily="34" charset="0"/>
+              </a:rPr>
+              <a:t>Ensure success:</a:t>
+            </a:r>
+          </a:p>
+          <a:p>
+            <a:pPr marL="342900" indent="-342900" algn="l">
+              <a:buFont typeface="Arial" panose="020B0604020202020204" pitchFamily="34" charset="0"/>
+              <a:buChar char="•"/>
+            </a:pPr>
+            <a:r>
+              <a:rPr lang="en-US">
+                <a:latin typeface="Calibri" panose="020F0502020204030204" pitchFamily="34" charset="0"/>
+                <a:cs typeface="Calibri" panose="020F0502020204030204" pitchFamily="34" charset="0"/>
+              </a:rPr>
+              <a:t>Close collaboration with stakeholders</a:t>
+            </a:r>
+          </a:p>
+          <a:p>
+            <a:pPr marL="342900" indent="-342900" algn="l">
+              <a:buFont typeface="Arial" panose="020B0604020202020204" pitchFamily="34" charset="0"/>
+              <a:buChar char="•"/>
+            </a:pPr>
+            <a:r>
+              <a:rPr lang="en-US">
+                <a:latin typeface="Calibri" panose="020F0502020204030204" pitchFamily="34" charset="0"/>
+                <a:cs typeface="Calibri" panose="020F0502020204030204" pitchFamily="34" charset="0"/>
+              </a:rPr>
+              <a:t>The engineering practices</a:t>
+            </a:r>
+          </a:p>
+        </p:txBody>
+      </p:sp>
+    </p:spTree>
+    <p:extLst>
+      <p:ext uri="{BB962C8B-B14F-4D97-AF65-F5344CB8AC3E}">
+        <p14:creationId xmlns:p14="http://schemas.microsoft.com/office/powerpoint/2010/main" val="2332563554"/>
+      </p:ext>
+    </p:extLst>
+  </p:cSld>
+  <p:clrMapOvr>
+    <a:masterClrMapping/>
+  </p:clrMapOvr>
+</p:sld>
+</file>
+
+<file path=ppt/slides/slide4.xml><?xml version="1.0" encoding="utf-8"?>
+<p:sld xmlns:a="http://schemas.openxmlformats.org/drawingml/2006/main" xmlns:r="http://schemas.openxmlformats.org/officeDocument/2006/relationships" xmlns:p="http://schemas.openxmlformats.org/presentationml/2006/main">
+  <p:cSld>
+    <p:spTree>
+      <p:nvGrpSpPr>
+        <p:cNvPr id="1" name=""/>
+        <p:cNvGrpSpPr/>
+        <p:nvPr/>
+      </p:nvGrpSpPr>
+      <p:grpSpPr>
+        <a:xfrm>
+          <a:off x="0" y="0"/>
+          <a:ext cx="0" cy="0"/>
+          <a:chOff x="0" y="0"/>
+          <a:chExt cx="0" cy="0"/>
+        </a:xfrm>
+      </p:grpSpPr>
+      <p:sp>
+        <p:nvSpPr>
           <p:cNvPr id="10" name="Rektangel 9">
             <a:extLst>
               <a:ext uri="{FF2B5EF4-FFF2-40B4-BE49-F238E27FC236}">
@@ -4557,10 +5808,10 @@
           <a:p>
             <a:pPr algn="ctr"/>
             <a:r>
-              <a:rPr lang="en-US" dirty="0"/>
+              <a:rPr lang="en-US"/>
               <a:t>Size sorting</a:t>
             </a:r>
-            <a:endParaRPr lang="LID4096" dirty="0"/>
+            <a:endParaRPr lang="LID4096"/>
           </a:p>
         </p:txBody>
       </p:sp>
@@ -4607,10 +5858,10 @@
           <a:p>
             <a:pPr algn="ctr"/>
             <a:r>
-              <a:rPr lang="en-US" dirty="0"/>
+              <a:rPr lang="en-US"/>
               <a:t>Weighting  and image collection</a:t>
             </a:r>
-            <a:endParaRPr lang="LID4096" dirty="0"/>
+            <a:endParaRPr lang="LID4096"/>
           </a:p>
         </p:txBody>
       </p:sp>
@@ -4657,10 +5908,10 @@
           <a:p>
             <a:pPr algn="ctr"/>
             <a:r>
-              <a:rPr lang="en-US" dirty="0"/>
+              <a:rPr lang="en-US"/>
               <a:t>Data Analysis =&gt; Brick id</a:t>
             </a:r>
-            <a:endParaRPr lang="LID4096" dirty="0"/>
+            <a:endParaRPr lang="LID4096"/>
           </a:p>
         </p:txBody>
       </p:sp>
@@ -4726,7 +5977,7 @@
             <a:lstStyle/>
             <a:p>
               <a:pPr algn="ctr"/>
-              <a:endParaRPr lang="LID4096" dirty="0"/>
+              <a:endParaRPr lang="LID4096"/>
             </a:p>
           </p:txBody>
         </p:sp>
@@ -4772,7 +6023,7 @@
             <a:lstStyle/>
             <a:p>
               <a:pPr algn="ctr"/>
-              <a:endParaRPr lang="LID4096" dirty="0"/>
+              <a:endParaRPr lang="LID4096"/>
             </a:p>
           </p:txBody>
         </p:sp>
@@ -4818,7 +6069,7 @@
             <a:lstStyle/>
             <a:p>
               <a:pPr algn="ctr"/>
-              <a:endParaRPr lang="LID4096" dirty="0"/>
+              <a:endParaRPr lang="LID4096"/>
             </a:p>
           </p:txBody>
         </p:sp>
@@ -4864,7 +6115,7 @@
             <a:lstStyle/>
             <a:p>
               <a:pPr algn="ctr"/>
-              <a:endParaRPr lang="LID4096" dirty="0"/>
+              <a:endParaRPr lang="LID4096"/>
             </a:p>
           </p:txBody>
         </p:sp>
@@ -4910,7 +6161,7 @@
             <a:lstStyle/>
             <a:p>
               <a:pPr algn="ctr"/>
-              <a:endParaRPr lang="LID4096" dirty="0"/>
+              <a:endParaRPr lang="LID4096"/>
             </a:p>
           </p:txBody>
         </p:sp>
@@ -4977,7 +6228,7 @@
             <a:lstStyle/>
             <a:p>
               <a:pPr algn="ctr"/>
-              <a:endParaRPr lang="LID4096" dirty="0"/>
+              <a:endParaRPr lang="LID4096"/>
             </a:p>
           </p:txBody>
         </p:sp>
@@ -5023,7 +6274,7 @@
             <a:lstStyle/>
             <a:p>
               <a:pPr algn="ctr"/>
-              <a:endParaRPr lang="LID4096" dirty="0"/>
+              <a:endParaRPr lang="LID4096"/>
             </a:p>
           </p:txBody>
         </p:sp>
@@ -5069,7 +6320,7 @@
             <a:lstStyle/>
             <a:p>
               <a:pPr algn="ctr"/>
-              <a:endParaRPr lang="LID4096" dirty="0"/>
+              <a:endParaRPr lang="LID4096"/>
             </a:p>
           </p:txBody>
         </p:sp>
@@ -5115,7 +6366,7 @@
             <a:lstStyle/>
             <a:p>
               <a:pPr algn="ctr"/>
-              <a:endParaRPr lang="LID4096" dirty="0"/>
+              <a:endParaRPr lang="LID4096"/>
             </a:p>
           </p:txBody>
         </p:sp>
@@ -5161,7 +6412,7 @@
             <a:lstStyle/>
             <a:p>
               <a:pPr algn="ctr"/>
-              <a:endParaRPr lang="LID4096" dirty="0"/>
+              <a:endParaRPr lang="LID4096"/>
             </a:p>
           </p:txBody>
         </p:sp>
@@ -5194,12 +6445,18 @@
           </a:bodyPr>
           <a:lstStyle/>
           <a:p>
+            <a:r>
+              <a:rPr lang="en-US" sz="2400"/>
+              <a:t>ML/image recognition: Priorities.</a:t>
+            </a:r>
+          </a:p>
+          <a:p>
             <a:pPr marL="285750" indent="-285750">
               <a:buFont typeface="Arial" panose="020B0604020202020204" pitchFamily="34" charset="0"/>
               <a:buChar char="•"/>
             </a:pPr>
             <a:r>
-              <a:rPr lang="en-US" sz="2400" dirty="0"/>
+              <a:rPr lang="en-US" sz="2400"/>
               <a:t>If the bricks should be size and/or color sorted into a number of categories </a:t>
             </a:r>
           </a:p>
@@ -5209,8 +6466,8 @@
               <a:buChar char="•"/>
             </a:pPr>
             <a:r>
-              <a:rPr lang="en-US" sz="2400" dirty="0"/>
-              <a:t>This will make it simpler to categorize with a series of different CNN each specializing in that size/color</a:t>
+              <a:rPr lang="en-US" sz="2400"/>
+              <a:t>CI: continues buildup of the image dataset. </a:t>
             </a:r>
           </a:p>
           <a:p>
@@ -5219,8 +6476,8 @@
               <a:buChar char="•"/>
             </a:pPr>
             <a:r>
-              <a:rPr lang="en-US" sz="2400" dirty="0"/>
-              <a:t>The shape of the brick could be added with a 2D laser line on the belt.</a:t>
+              <a:rPr lang="en-US" sz="2400"/>
+              <a:t>This will make it simpler to categorize with a series of different CNN each specializing in that size/color</a:t>
             </a:r>
           </a:p>
           <a:p>
@@ -5229,8 +6486,8 @@
               <a:buChar char="•"/>
             </a:pPr>
             <a:r>
-              <a:rPr lang="en-US" sz="2400" dirty="0"/>
-              <a:t>As added info each brick could also be weighed.</a:t>
+              <a:rPr lang="en-US" sz="2400"/>
+              <a:t>The shape of the brick could be added with a 2D laser line on the belt.</a:t>
             </a:r>
           </a:p>
           <a:p>
@@ -5239,8 +6496,8 @@
               <a:buChar char="•"/>
             </a:pPr>
             <a:r>
-              <a:rPr lang="en-US" sz="2400" dirty="0"/>
-              <a:t>It could be necessary to get a second images after a flipping of the brick. </a:t>
+              <a:rPr lang="en-US" sz="2400"/>
+              <a:t>As added info each brick could also be weighed.</a:t>
             </a:r>
           </a:p>
           <a:p>
@@ -5249,8 +6506,8 @@
               <a:buChar char="•"/>
             </a:pPr>
             <a:r>
-              <a:rPr lang="en-US" sz="2400" dirty="0"/>
-              <a:t>If neither images are conclusive the brick would end up in the rerun bucket.</a:t>
+              <a:rPr lang="en-US" sz="2400"/>
+              <a:t>It could be necessary to get a second images after a flipping of the brick. </a:t>
             </a:r>
           </a:p>
           <a:p>
@@ -5259,16 +6516,8 @@
               <a:buChar char="•"/>
             </a:pPr>
             <a:r>
-              <a:rPr lang="en-US" sz="2400" dirty="0"/>
-              <a:t>All images should be saved with </a:t>
-            </a:r>
-            <a:r>
-              <a:rPr lang="en-US" sz="2400" dirty="0" err="1"/>
-              <a:t>prod_id</a:t>
-            </a:r>
-            <a:r>
-              <a:rPr lang="en-US" sz="2400" dirty="0"/>
-              <a:t> possible in the cloud or on a sperate NAS</a:t>
+              <a:rPr lang="en-US" sz="2400"/>
+              <a:t>If neither images are conclusive the brick would end up in the rerun bucket.</a:t>
             </a:r>
           </a:p>
           <a:p>
@@ -5276,14 +6525,19 @@
               <a:buFont typeface="Arial" panose="020B0604020202020204" pitchFamily="34" charset="0"/>
               <a:buChar char="•"/>
             </a:pPr>
-            <a:endParaRPr lang="en-US" sz="2400" dirty="0"/>
-          </a:p>
-          <a:p>
-            <a:pPr marL="285750" indent="-285750">
-              <a:buFont typeface="Arial" panose="020B0604020202020204" pitchFamily="34" charset="0"/>
-              <a:buChar char="•"/>
-            </a:pPr>
-            <a:endParaRPr lang="LID4096" sz="2400" dirty="0"/>
+            <a:r>
+              <a:rPr lang="en-US" sz="2400"/>
+              <a:t>All images should be saved with </a:t>
+            </a:r>
+            <a:r>
+              <a:rPr lang="en-US" sz="2400" err="1"/>
+              <a:t>prod_id</a:t>
+            </a:r>
+            <a:r>
+              <a:rPr lang="en-US" sz="2400"/>
+              <a:t> possible in the cloud or on a sperate NAS</a:t>
+            </a:r>
+            <a:endParaRPr lang="LID4096" sz="2400"/>
           </a:p>
         </p:txBody>
       </p:sp>
@@ -5353,7 +6607,7 @@
             <a:lstStyle/>
             <a:p>
               <a:pPr algn="ctr"/>
-              <a:endParaRPr lang="LID4096" dirty="0"/>
+              <a:endParaRPr lang="LID4096"/>
             </a:p>
           </p:txBody>
         </p:sp>
@@ -5400,7 +6654,7 @@
             <a:lstStyle/>
             <a:p>
               <a:pPr algn="ctr"/>
-              <a:endParaRPr lang="LID4096" dirty="0"/>
+              <a:endParaRPr lang="LID4096"/>
             </a:p>
           </p:txBody>
         </p:sp>
@@ -5447,7 +6701,7 @@
             <a:lstStyle/>
             <a:p>
               <a:pPr algn="ctr"/>
-              <a:endParaRPr lang="LID4096" dirty="0"/>
+              <a:endParaRPr lang="LID4096"/>
             </a:p>
           </p:txBody>
         </p:sp>
@@ -5494,7 +6748,7 @@
             <a:lstStyle/>
             <a:p>
               <a:pPr algn="ctr"/>
-              <a:endParaRPr lang="LID4096" dirty="0"/>
+              <a:endParaRPr lang="LID4096"/>
             </a:p>
           </p:txBody>
         </p:sp>
@@ -5541,7 +6795,7 @@
             <a:lstStyle/>
             <a:p>
               <a:pPr algn="ctr"/>
-              <a:endParaRPr lang="LID4096" dirty="0"/>
+              <a:endParaRPr lang="LID4096"/>
             </a:p>
           </p:txBody>
         </p:sp>
@@ -5612,7 +6866,7 @@
             <a:lstStyle/>
             <a:p>
               <a:pPr algn="ctr"/>
-              <a:endParaRPr lang="LID4096" dirty="0"/>
+              <a:endParaRPr lang="LID4096"/>
             </a:p>
           </p:txBody>
         </p:sp>
@@ -5659,7 +6913,7 @@
             <a:lstStyle/>
             <a:p>
               <a:pPr algn="ctr"/>
-              <a:endParaRPr lang="LID4096" dirty="0"/>
+              <a:endParaRPr lang="LID4096"/>
             </a:p>
           </p:txBody>
         </p:sp>
@@ -5706,7 +6960,7 @@
             <a:lstStyle/>
             <a:p>
               <a:pPr algn="ctr"/>
-              <a:endParaRPr lang="LID4096" dirty="0"/>
+              <a:endParaRPr lang="LID4096"/>
             </a:p>
           </p:txBody>
         </p:sp>
@@ -5753,7 +7007,7 @@
             <a:lstStyle/>
             <a:p>
               <a:pPr algn="ctr"/>
-              <a:endParaRPr lang="LID4096" dirty="0"/>
+              <a:endParaRPr lang="LID4096"/>
             </a:p>
           </p:txBody>
         </p:sp>
@@ -5800,7 +7054,7 @@
             <a:lstStyle/>
             <a:p>
               <a:pPr algn="ctr"/>
-              <a:endParaRPr lang="LID4096" dirty="0"/>
+              <a:endParaRPr lang="LID4096"/>
             </a:p>
           </p:txBody>
         </p:sp>
@@ -5818,7 +7072,7 @@
 </p:sld>
 </file>
 
-<file path=ppt/slides/slide4.xml><?xml version="1.0" encoding="utf-8"?>
+<file path=ppt/slides/slide5.xml><?xml version="1.0" encoding="utf-8"?>
 <p:sld xmlns:a="http://schemas.openxmlformats.org/drawingml/2006/main" xmlns:r="http://schemas.openxmlformats.org/officeDocument/2006/relationships" xmlns:p="http://schemas.openxmlformats.org/presentationml/2006/main">
   <p:cSld>
     <p:spTree>
@@ -5878,10 +7132,10 @@
           <a:p>
             <a:pPr algn="ctr"/>
             <a:r>
-              <a:rPr lang="en-US" dirty="0"/>
+              <a:rPr lang="en-US"/>
               <a:t>Sorting to sets</a:t>
             </a:r>
-            <a:endParaRPr lang="LID4096" dirty="0"/>
+            <a:endParaRPr lang="LID4096"/>
           </a:p>
         </p:txBody>
       </p:sp>
@@ -6168,14 +7422,14 @@
           <a:p>
             <a:pPr algn="ctr"/>
             <a:r>
-              <a:rPr lang="en-US" dirty="0" err="1"/>
+              <a:rPr lang="en-US" err="1"/>
               <a:t>Set_id</a:t>
             </a:r>
             <a:r>
-              <a:rPr lang="en-US" dirty="0"/>
+              <a:rPr lang="en-US"/>
               <a:t> =251</a:t>
             </a:r>
-            <a:endParaRPr lang="LID4096" dirty="0"/>
+            <a:endParaRPr lang="LID4096"/>
           </a:p>
         </p:txBody>
       </p:sp>
@@ -6225,14 +7479,14 @@
           <a:p>
             <a:pPr algn="ctr"/>
             <a:r>
-              <a:rPr lang="en-US" dirty="0" err="1"/>
+              <a:rPr lang="en-US" err="1"/>
               <a:t>Set_id</a:t>
             </a:r>
             <a:r>
-              <a:rPr lang="en-US" dirty="0"/>
+              <a:rPr lang="en-US"/>
               <a:t> =211</a:t>
             </a:r>
-            <a:endParaRPr lang="LID4096" dirty="0"/>
+            <a:endParaRPr lang="LID4096"/>
           </a:p>
         </p:txBody>
       </p:sp>
@@ -6282,14 +7536,14 @@
           <a:p>
             <a:pPr algn="ctr"/>
             <a:r>
-              <a:rPr lang="en-US" dirty="0" err="1"/>
+              <a:rPr lang="en-US" err="1"/>
               <a:t>Set_id</a:t>
             </a:r>
             <a:r>
-              <a:rPr lang="en-US" dirty="0"/>
+              <a:rPr lang="en-US"/>
               <a:t> =251</a:t>
             </a:r>
-            <a:endParaRPr lang="LID4096" dirty="0"/>
+            <a:endParaRPr lang="LID4096"/>
           </a:p>
         </p:txBody>
       </p:sp>
@@ -6355,7 +7609,7 @@
             <a:lstStyle/>
             <a:p>
               <a:pPr algn="ctr"/>
-              <a:endParaRPr lang="LID4096" dirty="0"/>
+              <a:endParaRPr lang="LID4096"/>
             </a:p>
           </p:txBody>
         </p:sp>
@@ -6401,7 +7655,7 @@
             <a:lstStyle/>
             <a:p>
               <a:pPr algn="ctr"/>
-              <a:endParaRPr lang="LID4096" dirty="0"/>
+              <a:endParaRPr lang="LID4096"/>
             </a:p>
           </p:txBody>
         </p:sp>
@@ -6450,7 +7704,7 @@
             <a:lstStyle/>
             <a:p>
               <a:pPr algn="ctr"/>
-              <a:endParaRPr lang="LID4096" dirty="0"/>
+              <a:endParaRPr lang="LID4096"/>
             </a:p>
           </p:txBody>
         </p:sp>
@@ -6496,7 +7750,7 @@
             <a:lstStyle/>
             <a:p>
               <a:pPr algn="ctr"/>
-              <a:endParaRPr lang="LID4096" dirty="0"/>
+              <a:endParaRPr lang="LID4096"/>
             </a:p>
           </p:txBody>
         </p:sp>
@@ -6545,7 +7799,7 @@
             <a:lstStyle/>
             <a:p>
               <a:pPr algn="ctr"/>
-              <a:endParaRPr lang="LID4096" dirty="0"/>
+              <a:endParaRPr lang="LID4096"/>
             </a:p>
           </p:txBody>
         </p:sp>
@@ -6591,7 +7845,7 @@
             <a:lstStyle/>
             <a:p>
               <a:pPr algn="ctr"/>
-              <a:endParaRPr lang="LID4096" dirty="0"/>
+              <a:endParaRPr lang="LID4096"/>
             </a:p>
           </p:txBody>
         </p:sp>
@@ -6658,7 +7912,7 @@
             <a:lstStyle/>
             <a:p>
               <a:pPr algn="ctr"/>
-              <a:endParaRPr lang="LID4096" dirty="0"/>
+              <a:endParaRPr lang="LID4096"/>
             </a:p>
           </p:txBody>
         </p:sp>
@@ -6704,7 +7958,7 @@
             <a:lstStyle/>
             <a:p>
               <a:pPr algn="ctr"/>
-              <a:endParaRPr lang="LID4096" dirty="0"/>
+              <a:endParaRPr lang="LID4096"/>
             </a:p>
           </p:txBody>
         </p:sp>
@@ -6750,7 +8004,7 @@
             <a:lstStyle/>
             <a:p>
               <a:pPr algn="ctr"/>
-              <a:endParaRPr lang="LID4096" dirty="0"/>
+              <a:endParaRPr lang="LID4096"/>
             </a:p>
           </p:txBody>
         </p:sp>
@@ -6796,7 +8050,7 @@
             <a:lstStyle/>
             <a:p>
               <a:pPr algn="ctr"/>
-              <a:endParaRPr lang="LID4096" dirty="0"/>
+              <a:endParaRPr lang="LID4096"/>
             </a:p>
           </p:txBody>
         </p:sp>
@@ -6842,7 +8096,7 @@
             <a:lstStyle/>
             <a:p>
               <a:pPr algn="ctr"/>
-              <a:endParaRPr lang="LID4096" dirty="0"/>
+              <a:endParaRPr lang="LID4096"/>
             </a:p>
           </p:txBody>
         </p:sp>
@@ -6893,14 +8147,14 @@
           <a:p>
             <a:pPr algn="ctr"/>
             <a:r>
-              <a:rPr lang="en-US" dirty="0" err="1"/>
+              <a:rPr lang="en-US" err="1"/>
               <a:t>Set_id</a:t>
             </a:r>
             <a:r>
-              <a:rPr lang="en-US" dirty="0"/>
+              <a:rPr lang="en-US"/>
               <a:t> =2</a:t>
             </a:r>
-            <a:endParaRPr lang="LID4096" dirty="0"/>
+            <a:endParaRPr lang="LID4096"/>
           </a:p>
         </p:txBody>
       </p:sp>
@@ -6966,7 +8220,7 @@
             <a:lstStyle/>
             <a:p>
               <a:pPr algn="ctr"/>
-              <a:endParaRPr lang="LID4096" dirty="0"/>
+              <a:endParaRPr lang="LID4096"/>
             </a:p>
           </p:txBody>
         </p:sp>
@@ -7012,7 +8266,7 @@
             <a:lstStyle/>
             <a:p>
               <a:pPr algn="ctr"/>
-              <a:endParaRPr lang="LID4096" dirty="0"/>
+              <a:endParaRPr lang="LID4096"/>
             </a:p>
           </p:txBody>
         </p:sp>
@@ -7061,7 +8315,7 @@
             <a:lstStyle/>
             <a:p>
               <a:pPr algn="ctr"/>
-              <a:endParaRPr lang="LID4096" dirty="0"/>
+              <a:endParaRPr lang="LID4096"/>
             </a:p>
           </p:txBody>
         </p:sp>
@@ -7107,7 +8361,7 @@
             <a:lstStyle/>
             <a:p>
               <a:pPr algn="ctr"/>
-              <a:endParaRPr lang="LID4096" dirty="0"/>
+              <a:endParaRPr lang="LID4096"/>
             </a:p>
           </p:txBody>
         </p:sp>
@@ -7156,7 +8410,7 @@
             <a:lstStyle/>
             <a:p>
               <a:pPr algn="ctr"/>
-              <a:endParaRPr lang="LID4096" dirty="0"/>
+              <a:endParaRPr lang="LID4096"/>
             </a:p>
           </p:txBody>
         </p:sp>
@@ -7202,7 +8456,7 @@
             <a:lstStyle/>
             <a:p>
               <a:pPr algn="ctr"/>
-              <a:endParaRPr lang="LID4096" dirty="0"/>
+              <a:endParaRPr lang="LID4096"/>
             </a:p>
           </p:txBody>
         </p:sp>
@@ -7240,7 +8494,7 @@
               <a:buChar char="•"/>
             </a:pPr>
             <a:r>
-              <a:rPr lang="en-US" sz="2400" dirty="0"/>
+              <a:rPr lang="en-US" sz="2400"/>
               <a:t>Every station has its own robot/bucket and its own running set that it is working on</a:t>
             </a:r>
           </a:p>
@@ -7250,7 +8504,7 @@
               <a:buChar char="•"/>
             </a:pPr>
             <a:r>
-              <a:rPr lang="en-US" sz="2400" dirty="0"/>
+              <a:rPr lang="en-US" sz="2400"/>
               <a:t>If a brick comes by that is not yet in the set but is needed the bucket will turn</a:t>
             </a:r>
           </a:p>
@@ -7260,7 +8514,7 @@
               <a:buChar char="•"/>
             </a:pPr>
             <a:r>
-              <a:rPr lang="en-US" sz="2400" dirty="0"/>
+              <a:rPr lang="en-US" sz="2400"/>
               <a:t>The running set will then be updated.</a:t>
             </a:r>
           </a:p>
@@ -7270,7 +8524,7 @@
               <a:buChar char="•"/>
             </a:pPr>
             <a:r>
-              <a:rPr lang="en-US" sz="2400" dirty="0"/>
+              <a:rPr lang="en-US" sz="2400"/>
               <a:t>Once a set is complete a picture will be taken of the set. This could work as a validation. </a:t>
             </a:r>
           </a:p>
@@ -7280,7 +8534,7 @@
               <a:buChar char="•"/>
             </a:pPr>
             <a:r>
-              <a:rPr lang="en-US" sz="2400" dirty="0"/>
+              <a:rPr lang="en-US" sz="2400"/>
               <a:t>A complete set will then be packed and a new set will be started at the station. </a:t>
             </a:r>
           </a:p>
@@ -7290,7 +8544,7 @@
               <a:buChar char="•"/>
             </a:pPr>
             <a:r>
-              <a:rPr lang="en-US" sz="2400" dirty="0"/>
+              <a:rPr lang="en-US" sz="2400"/>
               <a:t>At the end all the bricks which does not fit a running set will end up. </a:t>
             </a:r>
           </a:p>
@@ -7300,10 +8554,10 @@
               <a:buChar char="•"/>
             </a:pPr>
             <a:r>
-              <a:rPr lang="en-US" sz="2400" dirty="0"/>
+              <a:rPr lang="en-US" sz="2400"/>
               <a:t>There should be at least twice as many stations as different sets if we expect all to be sorted. </a:t>
             </a:r>
-            <a:endParaRPr lang="LID4096" sz="2400" dirty="0"/>
+            <a:endParaRPr lang="LID4096" sz="2400"/>
           </a:p>
         </p:txBody>
       </p:sp>
@@ -7446,14 +8700,14 @@
           <a:p>
             <a:pPr algn="ctr"/>
             <a:r>
-              <a:rPr lang="en-US" dirty="0" err="1"/>
+              <a:rPr lang="en-US" err="1"/>
               <a:t>Set_id</a:t>
             </a:r>
             <a:r>
-              <a:rPr lang="en-US" dirty="0"/>
+              <a:rPr lang="en-US"/>
               <a:t> =42</a:t>
             </a:r>
-            <a:endParaRPr lang="LID4096" dirty="0"/>
+            <a:endParaRPr lang="LID4096"/>
           </a:p>
         </p:txBody>
       </p:sp>
@@ -7526,7 +8780,7 @@
             <a:lstStyle/>
             <a:p>
               <a:pPr algn="ctr"/>
-              <a:endParaRPr lang="LID4096" dirty="0"/>
+              <a:endParaRPr lang="LID4096"/>
             </a:p>
           </p:txBody>
         </p:sp>
@@ -7573,7 +8827,7 @@
             <a:lstStyle/>
             <a:p>
               <a:pPr algn="ctr"/>
-              <a:endParaRPr lang="LID4096" dirty="0"/>
+              <a:endParaRPr lang="LID4096"/>
             </a:p>
           </p:txBody>
         </p:sp>
@@ -7620,7 +8874,7 @@
             <a:lstStyle/>
             <a:p>
               <a:pPr algn="ctr"/>
-              <a:endParaRPr lang="LID4096" dirty="0"/>
+              <a:endParaRPr lang="LID4096"/>
             </a:p>
           </p:txBody>
         </p:sp>
@@ -7667,7 +8921,7 @@
             <a:lstStyle/>
             <a:p>
               <a:pPr algn="ctr"/>
-              <a:endParaRPr lang="LID4096" dirty="0"/>
+              <a:endParaRPr lang="LID4096"/>
             </a:p>
           </p:txBody>
         </p:sp>
@@ -7714,7 +8968,7 @@
             <a:lstStyle/>
             <a:p>
               <a:pPr algn="ctr"/>
-              <a:endParaRPr lang="LID4096" dirty="0"/>
+              <a:endParaRPr lang="LID4096"/>
             </a:p>
           </p:txBody>
         </p:sp>
@@ -7781,7 +9035,7 @@
             <a:lstStyle/>
             <a:p>
               <a:pPr algn="ctr"/>
-              <a:endParaRPr lang="LID4096" dirty="0"/>
+              <a:endParaRPr lang="LID4096"/>
             </a:p>
           </p:txBody>
         </p:sp>
@@ -7827,7 +9081,7 @@
             <a:lstStyle/>
             <a:p>
               <a:pPr algn="ctr"/>
-              <a:endParaRPr lang="LID4096" dirty="0"/>
+              <a:endParaRPr lang="LID4096"/>
             </a:p>
           </p:txBody>
         </p:sp>
@@ -7876,7 +9130,7 @@
             <a:lstStyle/>
             <a:p>
               <a:pPr algn="ctr"/>
-              <a:endParaRPr lang="LID4096" dirty="0"/>
+              <a:endParaRPr lang="LID4096"/>
             </a:p>
           </p:txBody>
         </p:sp>
@@ -7922,7 +9176,7 @@
             <a:lstStyle/>
             <a:p>
               <a:pPr algn="ctr"/>
-              <a:endParaRPr lang="LID4096" dirty="0"/>
+              <a:endParaRPr lang="LID4096"/>
             </a:p>
           </p:txBody>
         </p:sp>
@@ -7971,7 +9225,7 @@
             <a:lstStyle/>
             <a:p>
               <a:pPr algn="ctr"/>
-              <a:endParaRPr lang="LID4096" dirty="0"/>
+              <a:endParaRPr lang="LID4096"/>
             </a:p>
           </p:txBody>
         </p:sp>
@@ -8017,7 +9271,7 @@
             <a:lstStyle/>
             <a:p>
               <a:pPr algn="ctr"/>
-              <a:endParaRPr lang="LID4096" dirty="0"/>
+              <a:endParaRPr lang="LID4096"/>
             </a:p>
           </p:txBody>
         </p:sp>
@@ -8088,7 +9342,7 @@
             <a:lstStyle/>
             <a:p>
               <a:pPr algn="ctr"/>
-              <a:endParaRPr lang="LID4096" dirty="0"/>
+              <a:endParaRPr lang="LID4096"/>
             </a:p>
           </p:txBody>
         </p:sp>
@@ -8135,7 +9389,7 @@
             <a:lstStyle/>
             <a:p>
               <a:pPr algn="ctr"/>
-              <a:endParaRPr lang="LID4096" dirty="0"/>
+              <a:endParaRPr lang="LID4096"/>
             </a:p>
           </p:txBody>
         </p:sp>
@@ -8182,7 +9436,7 @@
             <a:lstStyle/>
             <a:p>
               <a:pPr algn="ctr"/>
-              <a:endParaRPr lang="LID4096" dirty="0"/>
+              <a:endParaRPr lang="LID4096"/>
             </a:p>
           </p:txBody>
         </p:sp>
@@ -8229,7 +9483,7 @@
             <a:lstStyle/>
             <a:p>
               <a:pPr algn="ctr"/>
-              <a:endParaRPr lang="LID4096" dirty="0"/>
+              <a:endParaRPr lang="LID4096"/>
             </a:p>
           </p:txBody>
         </p:sp>
@@ -8276,7 +9530,7 @@
             <a:lstStyle/>
             <a:p>
               <a:pPr algn="ctr"/>
-              <a:endParaRPr lang="LID4096" dirty="0"/>
+              <a:endParaRPr lang="LID4096"/>
             </a:p>
           </p:txBody>
         </p:sp>
@@ -8327,17 +9581,17 @@
           <a:p>
             <a:pPr algn="ctr"/>
             <a:r>
-              <a:rPr lang="en-US" dirty="0"/>
+              <a:rPr lang="en-US"/>
               <a:t>Rerun/</a:t>
             </a:r>
           </a:p>
           <a:p>
             <a:pPr algn="ctr"/>
             <a:r>
-              <a:rPr lang="en-US" dirty="0"/>
+              <a:rPr lang="en-US"/>
               <a:t>man. sort</a:t>
             </a:r>
-            <a:endParaRPr lang="LID4096" dirty="0"/>
+            <a:endParaRPr lang="LID4096"/>
           </a:p>
         </p:txBody>
       </p:sp>
@@ -8345,6 +9599,583 @@
     <p:extLst>
       <p:ext uri="{BB962C8B-B14F-4D97-AF65-F5344CB8AC3E}">
         <p14:creationId xmlns:p14="http://schemas.microsoft.com/office/powerpoint/2010/main" val="1125108551"/>
+      </p:ext>
+    </p:extLst>
+  </p:cSld>
+  <p:clrMapOvr>
+    <a:masterClrMapping/>
+  </p:clrMapOvr>
+</p:sld>
+</file>
+
+<file path=ppt/slides/slide6.xml><?xml version="1.0" encoding="utf-8"?>
+<p:sld xmlns:a="http://schemas.openxmlformats.org/drawingml/2006/main" xmlns:r="http://schemas.openxmlformats.org/officeDocument/2006/relationships" xmlns:p="http://schemas.openxmlformats.org/presentationml/2006/main">
+  <p:cSld>
+    <p:spTree>
+      <p:nvGrpSpPr>
+        <p:cNvPr id="1" name=""/>
+        <p:cNvGrpSpPr/>
+        <p:nvPr/>
+      </p:nvGrpSpPr>
+      <p:grpSpPr>
+        <a:xfrm>
+          <a:off x="0" y="0"/>
+          <a:ext cx="0" cy="0"/>
+          <a:chOff x="0" y="0"/>
+          <a:chExt cx="0" cy="0"/>
+        </a:xfrm>
+      </p:grpSpPr>
+      <p:sp>
+        <p:nvSpPr>
+          <p:cNvPr id="2" name="Rektangel 1">
+            <a:extLst>
+              <a:ext uri="{FF2B5EF4-FFF2-40B4-BE49-F238E27FC236}">
+                <a16:creationId xmlns:a16="http://schemas.microsoft.com/office/drawing/2014/main" id="{8B79D8FA-9693-828C-1E0B-35E920201F2B}"/>
+              </a:ext>
+            </a:extLst>
+          </p:cNvPr>
+          <p:cNvSpPr/>
+          <p:nvPr/>
+        </p:nvSpPr>
+        <p:spPr>
+          <a:xfrm>
+            <a:off x="155046" y="105193"/>
+            <a:ext cx="1464816" cy="923277"/>
+          </a:xfrm>
+          <a:prstGeom prst="rect">
+            <a:avLst/>
+          </a:prstGeom>
+        </p:spPr>
+        <p:style>
+          <a:lnRef idx="2">
+            <a:schemeClr val="accent1">
+              <a:shade val="15000"/>
+            </a:schemeClr>
+          </a:lnRef>
+          <a:fillRef idx="1">
+            <a:schemeClr val="accent1"/>
+          </a:fillRef>
+          <a:effectRef idx="0">
+            <a:schemeClr val="accent1"/>
+          </a:effectRef>
+          <a:fontRef idx="minor">
+            <a:schemeClr val="lt1"/>
+          </a:fontRef>
+        </p:style>
+        <p:txBody>
+          <a:bodyPr rtlCol="0" anchor="ctr"/>
+          <a:lstStyle/>
+          <a:p>
+            <a:pPr algn="ctr"/>
+            <a:r>
+              <a:rPr lang="en-US"/>
+              <a:t>Databases</a:t>
+            </a:r>
+            <a:endParaRPr lang="LID4096"/>
+          </a:p>
+        </p:txBody>
+      </p:sp>
+      <p:pic>
+        <p:nvPicPr>
+          <p:cNvPr id="5" name="Billede 4">
+            <a:extLst>
+              <a:ext uri="{FF2B5EF4-FFF2-40B4-BE49-F238E27FC236}">
+                <a16:creationId xmlns:a16="http://schemas.microsoft.com/office/drawing/2014/main" id="{5CFF5ADE-F318-F1B0-C76E-F8562AC2C840}"/>
+              </a:ext>
+            </a:extLst>
+          </p:cNvPr>
+          <p:cNvPicPr>
+            <a:picLocks noChangeAspect="1"/>
+          </p:cNvPicPr>
+          <p:nvPr/>
+        </p:nvPicPr>
+        <p:blipFill>
+          <a:blip r:embed="rId2"/>
+          <a:stretch>
+            <a:fillRect/>
+          </a:stretch>
+        </p:blipFill>
+        <p:spPr>
+          <a:xfrm>
+            <a:off x="533912" y="1794657"/>
+            <a:ext cx="1857634" cy="1838582"/>
+          </a:xfrm>
+          <a:prstGeom prst="rect">
+            <a:avLst/>
+          </a:prstGeom>
+        </p:spPr>
+      </p:pic>
+      <p:pic>
+        <p:nvPicPr>
+          <p:cNvPr id="9" name="Billede 8">
+            <a:extLst>
+              <a:ext uri="{FF2B5EF4-FFF2-40B4-BE49-F238E27FC236}">
+                <a16:creationId xmlns:a16="http://schemas.microsoft.com/office/drawing/2014/main" id="{05E75ABE-F717-DA26-F0DA-28B8AC2649AD}"/>
+              </a:ext>
+            </a:extLst>
+          </p:cNvPr>
+          <p:cNvPicPr>
+            <a:picLocks noChangeAspect="1"/>
+          </p:cNvPicPr>
+          <p:nvPr/>
+        </p:nvPicPr>
+        <p:blipFill>
+          <a:blip r:embed="rId3"/>
+          <a:stretch>
+            <a:fillRect/>
+          </a:stretch>
+        </p:blipFill>
+        <p:spPr>
+          <a:xfrm>
+            <a:off x="495806" y="4327547"/>
+            <a:ext cx="1933845" cy="1095528"/>
+          </a:xfrm>
+          <a:prstGeom prst="rect">
+            <a:avLst/>
+          </a:prstGeom>
+        </p:spPr>
+      </p:pic>
+      <p:pic>
+        <p:nvPicPr>
+          <p:cNvPr id="12" name="Billede 11">
+            <a:extLst>
+              <a:ext uri="{FF2B5EF4-FFF2-40B4-BE49-F238E27FC236}">
+                <a16:creationId xmlns:a16="http://schemas.microsoft.com/office/drawing/2014/main" id="{09BD7CCA-33ED-C3B7-284C-DAD524AC682D}"/>
+              </a:ext>
+            </a:extLst>
+          </p:cNvPr>
+          <p:cNvPicPr>
+            <a:picLocks noChangeAspect="1"/>
+          </p:cNvPicPr>
+          <p:nvPr/>
+        </p:nvPicPr>
+        <p:blipFill>
+          <a:blip r:embed="rId4"/>
+          <a:stretch>
+            <a:fillRect/>
+          </a:stretch>
+        </p:blipFill>
+        <p:spPr>
+          <a:xfrm>
+            <a:off x="5000472" y="647851"/>
+            <a:ext cx="1486107" cy="2105319"/>
+          </a:xfrm>
+          <a:prstGeom prst="rect">
+            <a:avLst/>
+          </a:prstGeom>
+        </p:spPr>
+      </p:pic>
+      <p:pic>
+        <p:nvPicPr>
+          <p:cNvPr id="16" name="Billede 15">
+            <a:extLst>
+              <a:ext uri="{FF2B5EF4-FFF2-40B4-BE49-F238E27FC236}">
+                <a16:creationId xmlns:a16="http://schemas.microsoft.com/office/drawing/2014/main" id="{67069456-BFD6-B318-F15F-39442B9B6ACB}"/>
+              </a:ext>
+            </a:extLst>
+          </p:cNvPr>
+          <p:cNvPicPr>
+            <a:picLocks noChangeAspect="1"/>
+          </p:cNvPicPr>
+          <p:nvPr/>
+        </p:nvPicPr>
+        <p:blipFill>
+          <a:blip r:embed="rId5"/>
+          <a:stretch>
+            <a:fillRect/>
+          </a:stretch>
+        </p:blipFill>
+        <p:spPr>
+          <a:xfrm>
+            <a:off x="9095505" y="566831"/>
+            <a:ext cx="1409897" cy="1390844"/>
+          </a:xfrm>
+          <a:prstGeom prst="rect">
+            <a:avLst/>
+          </a:prstGeom>
+        </p:spPr>
+      </p:pic>
+      <p:pic>
+        <p:nvPicPr>
+          <p:cNvPr id="31" name="Billede 30">
+            <a:extLst>
+              <a:ext uri="{FF2B5EF4-FFF2-40B4-BE49-F238E27FC236}">
+                <a16:creationId xmlns:a16="http://schemas.microsoft.com/office/drawing/2014/main" id="{EE0B04C8-43E6-9950-DDC1-BBF340D32B99}"/>
+              </a:ext>
+            </a:extLst>
+          </p:cNvPr>
+          <p:cNvPicPr>
+            <a:picLocks noChangeAspect="1"/>
+          </p:cNvPicPr>
+          <p:nvPr/>
+        </p:nvPicPr>
+        <p:blipFill>
+          <a:blip r:embed="rId6"/>
+          <a:stretch>
+            <a:fillRect/>
+          </a:stretch>
+        </p:blipFill>
+        <p:spPr>
+          <a:xfrm>
+            <a:off x="4002597" y="4104831"/>
+            <a:ext cx="1838582" cy="1743318"/>
+          </a:xfrm>
+          <a:prstGeom prst="rect">
+            <a:avLst/>
+          </a:prstGeom>
+        </p:spPr>
+      </p:pic>
+      <p:pic>
+        <p:nvPicPr>
+          <p:cNvPr id="1027" name="Billede 1026">
+            <a:extLst>
+              <a:ext uri="{FF2B5EF4-FFF2-40B4-BE49-F238E27FC236}">
+                <a16:creationId xmlns:a16="http://schemas.microsoft.com/office/drawing/2014/main" id="{ECF492B3-8316-B88B-3DD7-B24EF75C8403}"/>
+              </a:ext>
+            </a:extLst>
+          </p:cNvPr>
+          <p:cNvPicPr>
+            <a:picLocks noChangeAspect="1"/>
+          </p:cNvPicPr>
+          <p:nvPr/>
+        </p:nvPicPr>
+        <p:blipFill>
+          <a:blip r:embed="rId7"/>
+          <a:stretch>
+            <a:fillRect/>
+          </a:stretch>
+        </p:blipFill>
+        <p:spPr>
+          <a:xfrm>
+            <a:off x="7075938" y="3106114"/>
+            <a:ext cx="1838582" cy="1066949"/>
+          </a:xfrm>
+          <a:prstGeom prst="rect">
+            <a:avLst/>
+          </a:prstGeom>
+        </p:spPr>
+      </p:pic>
+      <p:cxnSp>
+        <p:nvCxnSpPr>
+          <p:cNvPr id="1029" name="Forbindelse: vinklet 1028">
+            <a:extLst>
+              <a:ext uri="{FF2B5EF4-FFF2-40B4-BE49-F238E27FC236}">
+                <a16:creationId xmlns:a16="http://schemas.microsoft.com/office/drawing/2014/main" id="{DEEA79DD-7569-B61A-7E11-9BA847FDC8FB}"/>
+              </a:ext>
+            </a:extLst>
+          </p:cNvPr>
+          <p:cNvCxnSpPr>
+            <a:stCxn id="5" idx="3"/>
+            <a:endCxn id="12" idx="1"/>
+          </p:cNvCxnSpPr>
+          <p:nvPr/>
+        </p:nvCxnSpPr>
+        <p:spPr>
+          <a:xfrm flipV="1">
+            <a:off x="2391546" y="1700511"/>
+            <a:ext cx="2608926" cy="1013437"/>
+          </a:xfrm>
+          <a:prstGeom prst="bentConnector3">
+            <a:avLst/>
+          </a:prstGeom>
+          <a:ln>
+            <a:tailEnd type="triangle"/>
+          </a:ln>
+        </p:spPr>
+        <p:style>
+          <a:lnRef idx="1">
+            <a:schemeClr val="accent1"/>
+          </a:lnRef>
+          <a:fillRef idx="0">
+            <a:schemeClr val="accent1"/>
+          </a:fillRef>
+          <a:effectRef idx="0">
+            <a:schemeClr val="accent1"/>
+          </a:effectRef>
+          <a:fontRef idx="minor">
+            <a:schemeClr val="tx1"/>
+          </a:fontRef>
+        </p:style>
+      </p:cxnSp>
+      <p:cxnSp>
+        <p:nvCxnSpPr>
+          <p:cNvPr id="1032" name="Forbindelse: vinklet 1031">
+            <a:extLst>
+              <a:ext uri="{FF2B5EF4-FFF2-40B4-BE49-F238E27FC236}">
+                <a16:creationId xmlns:a16="http://schemas.microsoft.com/office/drawing/2014/main" id="{EBA8AC7C-F450-6F6C-6EDD-E10718DDF2A8}"/>
+              </a:ext>
+            </a:extLst>
+          </p:cNvPr>
+          <p:cNvCxnSpPr>
+            <a:cxnSpLocks/>
+            <a:stCxn id="5" idx="2"/>
+            <a:endCxn id="9" idx="0"/>
+          </p:cNvCxnSpPr>
+          <p:nvPr/>
+        </p:nvCxnSpPr>
+        <p:spPr>
+          <a:xfrm rot="5400000">
+            <a:off x="1115575" y="3980393"/>
+            <a:ext cx="694308" cy="12700"/>
+          </a:xfrm>
+          <a:prstGeom prst="bentConnector3">
+            <a:avLst/>
+          </a:prstGeom>
+          <a:ln>
+            <a:tailEnd type="triangle"/>
+          </a:ln>
+        </p:spPr>
+        <p:style>
+          <a:lnRef idx="1">
+            <a:schemeClr val="accent1"/>
+          </a:lnRef>
+          <a:fillRef idx="0">
+            <a:schemeClr val="accent1"/>
+          </a:fillRef>
+          <a:effectRef idx="0">
+            <a:schemeClr val="accent1"/>
+          </a:effectRef>
+          <a:fontRef idx="minor">
+            <a:schemeClr val="tx1"/>
+          </a:fontRef>
+        </p:style>
+      </p:cxnSp>
+      <p:cxnSp>
+        <p:nvCxnSpPr>
+          <p:cNvPr id="1068" name="Forbindelse: vinklet 1067">
+            <a:extLst>
+              <a:ext uri="{FF2B5EF4-FFF2-40B4-BE49-F238E27FC236}">
+                <a16:creationId xmlns:a16="http://schemas.microsoft.com/office/drawing/2014/main" id="{E6CFA77C-5E11-E6F0-BAB9-E53B8DA8489B}"/>
+              </a:ext>
+            </a:extLst>
+          </p:cNvPr>
+          <p:cNvCxnSpPr>
+            <a:stCxn id="9" idx="3"/>
+            <a:endCxn id="31" idx="1"/>
+          </p:cNvCxnSpPr>
+          <p:nvPr/>
+        </p:nvCxnSpPr>
+        <p:spPr>
+          <a:xfrm>
+            <a:off x="2429651" y="4875311"/>
+            <a:ext cx="1572946" cy="101179"/>
+          </a:xfrm>
+          <a:prstGeom prst="bentConnector3">
+            <a:avLst/>
+          </a:prstGeom>
+          <a:ln>
+            <a:tailEnd type="triangle"/>
+          </a:ln>
+        </p:spPr>
+        <p:style>
+          <a:lnRef idx="1">
+            <a:schemeClr val="accent1"/>
+          </a:lnRef>
+          <a:fillRef idx="0">
+            <a:schemeClr val="accent1"/>
+          </a:fillRef>
+          <a:effectRef idx="0">
+            <a:schemeClr val="accent1"/>
+          </a:effectRef>
+          <a:fontRef idx="minor">
+            <a:schemeClr val="tx1"/>
+          </a:fontRef>
+        </p:style>
+      </p:cxnSp>
+      <p:cxnSp>
+        <p:nvCxnSpPr>
+          <p:cNvPr id="1072" name="Forbindelse: vinklet 1071">
+            <a:extLst>
+              <a:ext uri="{FF2B5EF4-FFF2-40B4-BE49-F238E27FC236}">
+                <a16:creationId xmlns:a16="http://schemas.microsoft.com/office/drawing/2014/main" id="{C3C86DAA-F805-5BEC-072F-35ED908C087B}"/>
+              </a:ext>
+            </a:extLst>
+          </p:cNvPr>
+          <p:cNvCxnSpPr>
+            <a:stCxn id="12" idx="3"/>
+            <a:endCxn id="16" idx="1"/>
+          </p:cNvCxnSpPr>
+          <p:nvPr/>
+        </p:nvCxnSpPr>
+        <p:spPr>
+          <a:xfrm flipV="1">
+            <a:off x="6486579" y="1262253"/>
+            <a:ext cx="2608926" cy="438258"/>
+          </a:xfrm>
+          <a:prstGeom prst="bentConnector3">
+            <a:avLst/>
+          </a:prstGeom>
+          <a:ln>
+            <a:tailEnd type="triangle"/>
+          </a:ln>
+        </p:spPr>
+        <p:style>
+          <a:lnRef idx="1">
+            <a:schemeClr val="accent1"/>
+          </a:lnRef>
+          <a:fillRef idx="0">
+            <a:schemeClr val="accent1"/>
+          </a:fillRef>
+          <a:effectRef idx="0">
+            <a:schemeClr val="accent1"/>
+          </a:effectRef>
+          <a:fontRef idx="minor">
+            <a:schemeClr val="tx1"/>
+          </a:fontRef>
+        </p:style>
+      </p:cxnSp>
+      <p:cxnSp>
+        <p:nvCxnSpPr>
+          <p:cNvPr id="1090" name="Forbindelse: vinklet 1089">
+            <a:extLst>
+              <a:ext uri="{FF2B5EF4-FFF2-40B4-BE49-F238E27FC236}">
+                <a16:creationId xmlns:a16="http://schemas.microsoft.com/office/drawing/2014/main" id="{64F44295-A099-9B7A-25F7-6EF4C0DAE5C6}"/>
+              </a:ext>
+            </a:extLst>
+          </p:cNvPr>
+          <p:cNvCxnSpPr>
+            <a:stCxn id="1027" idx="1"/>
+            <a:endCxn id="12" idx="2"/>
+          </p:cNvCxnSpPr>
+          <p:nvPr/>
+        </p:nvCxnSpPr>
+        <p:spPr>
+          <a:xfrm rot="10800000">
+            <a:off x="5743526" y="2753171"/>
+            <a:ext cx="1332412" cy="886419"/>
+          </a:xfrm>
+          <a:prstGeom prst="bentConnector2">
+            <a:avLst/>
+          </a:prstGeom>
+          <a:ln>
+            <a:tailEnd type="triangle"/>
+          </a:ln>
+        </p:spPr>
+        <p:style>
+          <a:lnRef idx="1">
+            <a:schemeClr val="accent1"/>
+          </a:lnRef>
+          <a:fillRef idx="0">
+            <a:schemeClr val="accent1"/>
+          </a:fillRef>
+          <a:effectRef idx="0">
+            <a:schemeClr val="accent1"/>
+          </a:effectRef>
+          <a:fontRef idx="minor">
+            <a:schemeClr val="tx1"/>
+          </a:fontRef>
+        </p:style>
+      </p:cxnSp>
+      <p:cxnSp>
+        <p:nvCxnSpPr>
+          <p:cNvPr id="1092" name="Forbindelse: vinklet 1091">
+            <a:extLst>
+              <a:ext uri="{FF2B5EF4-FFF2-40B4-BE49-F238E27FC236}">
+                <a16:creationId xmlns:a16="http://schemas.microsoft.com/office/drawing/2014/main" id="{29227581-EB3E-A373-A6AB-D40821BA8EA0}"/>
+              </a:ext>
+            </a:extLst>
+          </p:cNvPr>
+          <p:cNvCxnSpPr>
+            <a:stCxn id="1027" idx="2"/>
+            <a:endCxn id="31" idx="3"/>
+          </p:cNvCxnSpPr>
+          <p:nvPr/>
+        </p:nvCxnSpPr>
+        <p:spPr>
+          <a:xfrm rot="5400000">
+            <a:off x="6516491" y="3497751"/>
+            <a:ext cx="803427" cy="2154050"/>
+          </a:xfrm>
+          <a:prstGeom prst="bentConnector2">
+            <a:avLst/>
+          </a:prstGeom>
+          <a:ln>
+            <a:tailEnd type="triangle"/>
+          </a:ln>
+        </p:spPr>
+        <p:style>
+          <a:lnRef idx="1">
+            <a:schemeClr val="accent1"/>
+          </a:lnRef>
+          <a:fillRef idx="0">
+            <a:schemeClr val="accent1"/>
+          </a:fillRef>
+          <a:effectRef idx="0">
+            <a:schemeClr val="accent1"/>
+          </a:effectRef>
+          <a:fontRef idx="minor">
+            <a:schemeClr val="tx1"/>
+          </a:fontRef>
+        </p:style>
+      </p:cxnSp>
+      <p:sp>
+        <p:nvSpPr>
+          <p:cNvPr id="1093" name="Tekstfelt 1092">
+            <a:extLst>
+              <a:ext uri="{FF2B5EF4-FFF2-40B4-BE49-F238E27FC236}">
+                <a16:creationId xmlns:a16="http://schemas.microsoft.com/office/drawing/2014/main" id="{C5562D73-52EE-BD71-E2CF-39EFBE484439}"/>
+              </a:ext>
+            </a:extLst>
+          </p:cNvPr>
+          <p:cNvSpPr txBox="1"/>
+          <p:nvPr/>
+        </p:nvSpPr>
+        <p:spPr>
+          <a:xfrm>
+            <a:off x="8558074" y="4976490"/>
+            <a:ext cx="3138120" cy="1477328"/>
+          </a:xfrm>
+          <a:prstGeom prst="rect">
+            <a:avLst/>
+          </a:prstGeom>
+          <a:noFill/>
+        </p:spPr>
+        <p:txBody>
+          <a:bodyPr wrap="square" rtlCol="0">
+            <a:spAutoFit/>
+          </a:bodyPr>
+          <a:lstStyle/>
+          <a:p>
+            <a:r>
+              <a:rPr lang="en-US"/>
+              <a:t>All tables should also have:</a:t>
+            </a:r>
+          </a:p>
+          <a:p>
+            <a:r>
+              <a:rPr lang="en-US"/>
+              <a:t>created</a:t>
+            </a:r>
+          </a:p>
+          <a:p>
+            <a:r>
+              <a:rPr lang="en-US"/>
+              <a:t>updated</a:t>
+            </a:r>
+          </a:p>
+          <a:p>
+            <a:r>
+              <a:rPr lang="en-US"/>
+              <a:t>version</a:t>
+            </a:r>
+          </a:p>
+          <a:p>
+            <a:r>
+              <a:rPr lang="en-US"/>
+              <a:t>And perhaps: </a:t>
+            </a:r>
+            <a:r>
+              <a:rPr lang="en-US" err="1"/>
+              <a:t>in_production</a:t>
+            </a:r>
+            <a:endParaRPr lang="LID4096"/>
+          </a:p>
+        </p:txBody>
+      </p:sp>
+    </p:spTree>
+    <p:extLst>
+      <p:ext uri="{BB962C8B-B14F-4D97-AF65-F5344CB8AC3E}">
+        <p14:creationId xmlns:p14="http://schemas.microsoft.com/office/powerpoint/2010/main" val="1186644031"/>
       </p:ext>
     </p:extLst>
   </p:cSld>

</xml_diff>